<commit_message>
Ajustes na apresentação final o TCC
</commit_message>
<xml_diff>
--- a/TCC/Resumo/Apresentação.pptx
+++ b/TCC/Resumo/Apresentação.pptx
@@ -21,12 +21,10 @@
     <p:sldId id="270" r:id="rId15"/>
     <p:sldId id="271" r:id="rId16"/>
     <p:sldId id="272" r:id="rId17"/>
-    <p:sldId id="273" r:id="rId18"/>
-    <p:sldId id="274" r:id="rId19"/>
-    <p:sldId id="275" r:id="rId20"/>
-    <p:sldId id="276" r:id="rId21"/>
-    <p:sldId id="277" r:id="rId22"/>
-    <p:sldId id="278" r:id="rId23"/>
+    <p:sldId id="274" r:id="rId18"/>
+    <p:sldId id="275" r:id="rId19"/>
+    <p:sldId id="276" r:id="rId20"/>
+    <p:sldId id="277" r:id="rId21"/>
   </p:sldIdLst>
   <p:sldSz cx="12192000" cy="6858000"/>
   <p:notesSz cx="6858000" cy="9144000"/>
@@ -4409,7 +4407,7 @@
           <a:p>
             <a:fld id="{48A87A34-81AB-432B-8DAE-1953F412C126}" type="datetimeFigureOut">
               <a:rPr lang="en-US" dirty="0"/>
-              <a:t>5/31/23</a:t>
+              <a:t>6/26/23</a:t>
             </a:fld>
             <a:endParaRPr lang="en-US" dirty="0"/>
           </a:p>
@@ -4671,7 +4669,7 @@
           <a:p>
             <a:fld id="{48A87A34-81AB-432B-8DAE-1953F412C126}" type="datetimeFigureOut">
               <a:rPr lang="en-US" dirty="0"/>
-              <a:t>5/31/23</a:t>
+              <a:t>6/26/23</a:t>
             </a:fld>
             <a:endParaRPr lang="en-US" dirty="0"/>
           </a:p>
@@ -4862,7 +4860,7 @@
           <a:p>
             <a:fld id="{48A87A34-81AB-432B-8DAE-1953F412C126}" type="datetimeFigureOut">
               <a:rPr lang="en-US" dirty="0"/>
-              <a:t>5/31/23</a:t>
+              <a:t>6/26/23</a:t>
             </a:fld>
             <a:endParaRPr lang="en-US" dirty="0"/>
           </a:p>
@@ -5120,7 +5118,7 @@
           <a:p>
             <a:fld id="{48A87A34-81AB-432B-8DAE-1953F412C126}" type="datetimeFigureOut">
               <a:rPr lang="en-US" dirty="0"/>
-              <a:t>5/31/23</a:t>
+              <a:t>6/26/23</a:t>
             </a:fld>
             <a:endParaRPr lang="en-US" dirty="0"/>
           </a:p>
@@ -5549,7 +5547,7 @@
           <a:p>
             <a:fld id="{48A87A34-81AB-432B-8DAE-1953F412C126}" type="datetimeFigureOut">
               <a:rPr lang="en-US" dirty="0"/>
-              <a:t>5/31/23</a:t>
+              <a:t>6/26/23</a:t>
             </a:fld>
             <a:endParaRPr lang="en-US" dirty="0"/>
           </a:p>
@@ -6090,7 +6088,7 @@
           <a:p>
             <a:fld id="{48A87A34-81AB-432B-8DAE-1953F412C126}" type="datetimeFigureOut">
               <a:rPr lang="en-US" dirty="0"/>
-              <a:t>5/31/23</a:t>
+              <a:t>6/26/23</a:t>
             </a:fld>
             <a:endParaRPr lang="en-US" dirty="0"/>
           </a:p>
@@ -6805,7 +6803,7 @@
           <a:p>
             <a:fld id="{48A87A34-81AB-432B-8DAE-1953F412C126}" type="datetimeFigureOut">
               <a:rPr lang="en-US" dirty="0"/>
-              <a:t>5/31/23</a:t>
+              <a:t>6/26/23</a:t>
             </a:fld>
             <a:endParaRPr lang="en-US" dirty="0"/>
           </a:p>
@@ -6970,7 +6968,7 @@
           <a:p>
             <a:fld id="{48A87A34-81AB-432B-8DAE-1953F412C126}" type="datetimeFigureOut">
               <a:rPr lang="en-US" dirty="0"/>
-              <a:t>5/31/23</a:t>
+              <a:t>6/26/23</a:t>
             </a:fld>
             <a:endParaRPr lang="en-US" dirty="0"/>
           </a:p>
@@ -7145,7 +7143,7 @@
           <a:p>
             <a:fld id="{48A87A34-81AB-432B-8DAE-1953F412C126}" type="datetimeFigureOut">
               <a:rPr lang="en-US" dirty="0"/>
-              <a:t>5/31/23</a:t>
+              <a:t>6/26/23</a:t>
             </a:fld>
             <a:endParaRPr lang="en-US" dirty="0"/>
           </a:p>
@@ -7310,7 +7308,7 @@
           <a:p>
             <a:fld id="{48A87A34-81AB-432B-8DAE-1953F412C126}" type="datetimeFigureOut">
               <a:rPr lang="en-US" dirty="0"/>
-              <a:t>5/31/23</a:t>
+              <a:t>6/26/23</a:t>
             </a:fld>
             <a:endParaRPr lang="en-US" dirty="0"/>
           </a:p>
@@ -7555,7 +7553,7 @@
           <a:p>
             <a:fld id="{48A87A34-81AB-432B-8DAE-1953F412C126}" type="datetimeFigureOut">
               <a:rPr lang="en-US" dirty="0"/>
-              <a:t>5/31/23</a:t>
+              <a:t>6/26/23</a:t>
             </a:fld>
             <a:endParaRPr lang="en-US" dirty="0"/>
           </a:p>
@@ -7782,7 +7780,7 @@
           <a:p>
             <a:fld id="{48A87A34-81AB-432B-8DAE-1953F412C126}" type="datetimeFigureOut">
               <a:rPr lang="en-US" dirty="0"/>
-              <a:t>5/31/23</a:t>
+              <a:t>6/26/23</a:t>
             </a:fld>
             <a:endParaRPr lang="en-US" dirty="0"/>
           </a:p>
@@ -8158,7 +8156,7 @@
           <a:p>
             <a:fld id="{48A87A34-81AB-432B-8DAE-1953F412C126}" type="datetimeFigureOut">
               <a:rPr lang="en-US" dirty="0"/>
-              <a:t>5/31/23</a:t>
+              <a:t>6/26/23</a:t>
             </a:fld>
             <a:endParaRPr lang="en-US" dirty="0"/>
           </a:p>
@@ -8271,7 +8269,7 @@
           <a:p>
             <a:fld id="{48A87A34-81AB-432B-8DAE-1953F412C126}" type="datetimeFigureOut">
               <a:rPr lang="en-US" dirty="0"/>
-              <a:t>5/31/23</a:t>
+              <a:t>6/26/23</a:t>
             </a:fld>
             <a:endParaRPr lang="en-US" dirty="0"/>
           </a:p>
@@ -8361,7 +8359,7 @@
           <a:p>
             <a:fld id="{48A87A34-81AB-432B-8DAE-1953F412C126}" type="datetimeFigureOut">
               <a:rPr lang="en-US" dirty="0"/>
-              <a:t>5/31/23</a:t>
+              <a:t>6/26/23</a:t>
             </a:fld>
             <a:endParaRPr lang="en-US" dirty="0"/>
           </a:p>
@@ -8605,7 +8603,7 @@
           <a:p>
             <a:fld id="{48A87A34-81AB-432B-8DAE-1953F412C126}" type="datetimeFigureOut">
               <a:rPr lang="en-US" dirty="0"/>
-              <a:t>5/31/23</a:t>
+              <a:t>6/26/23</a:t>
             </a:fld>
             <a:endParaRPr lang="en-US" dirty="0"/>
           </a:p>
@@ -8880,7 +8878,7 @@
           <a:p>
             <a:fld id="{48A87A34-81AB-432B-8DAE-1953F412C126}" type="datetimeFigureOut">
               <a:rPr lang="en-US" dirty="0"/>
-              <a:t>5/31/23</a:t>
+              <a:t>6/26/23</a:t>
             </a:fld>
             <a:endParaRPr lang="en-US" dirty="0"/>
           </a:p>
@@ -11953,7 +11951,7 @@
             <a:fld id="{48A87A34-81AB-432B-8DAE-1953F412C126}" type="datetimeFigureOut">
               <a:rPr lang="en-US" dirty="0"/>
               <a:pPr/>
-              <a:t>5/31/23</a:t>
+              <a:t>6/26/23</a:t>
             </a:fld>
             <a:endParaRPr lang="en-US" dirty="0"/>
           </a:p>
@@ -14446,17 +14444,12 @@
           <a:p>
             <a:pPr algn="ctr"/>
             <a:r>
-              <a:rPr lang="pt-BR" sz="3600" b="1" dirty="0">
-                <a:effectLst/>
-                <a:ea typeface="Times New Roman" panose="02020603050405020304" pitchFamily="18" charset="0"/>
+              <a:rPr lang="pt-BR" b="1" dirty="0">
+                <a:solidFill>
+                  <a:srgbClr val="FFFFFF"/>
+                </a:solidFill>
               </a:rPr>
-              <a:t>Implantação de ELT como alternativa ao ETL para transformação e análise de dados em grandes empresas</a:t>
-            </a:r>
-            <a:r>
-              <a:rPr lang="pt-BR" dirty="0">
-                <a:effectLst/>
-              </a:rPr>
-              <a:t> </a:t>
+              <a:t>Análise comparativa dos métodos de extração de dados ETL e ELT e suas vantagens e desvantagens</a:t>
             </a:r>
             <a:endParaRPr lang="pt-BR" dirty="0">
               <a:solidFill>
@@ -14579,19 +14572,6 @@
               </a:solidFill>
             </a:endParaRPr>
           </a:p>
-          <a:p>
-            <a:pPr marL="0" indent="0">
-              <a:buNone/>
-            </a:pPr>
-            <a:r>
-              <a:rPr lang="pt-BR" sz="2000" dirty="0">
-                <a:solidFill>
-                  <a:srgbClr val="FFFFFF"/>
-                </a:solidFill>
-              </a:rPr>
-              <a:t>VI DEVIR – ENCONTRO DE PESQUISADORES EM INOVAÇÃO E SOCIEDADE – UNIAESO – 2023.</a:t>
-            </a:r>
-          </a:p>
         </p:txBody>
       </p:sp>
     </p:spTree>
@@ -14711,7 +14691,7 @@
             </a:r>
             <a:r>
               <a:rPr lang="pt-BR" dirty="0"/>
-              <a:t> e validação de dados. As três fases do ETL são executadas em paralelo para economizar tempo (MICROSOFT, 2023).</a:t>
+              <a:t> e validação de dados. As três fases do ETL são executadas em paralelo para economizar tempo.</a:t>
             </a:r>
           </a:p>
         </p:txBody>
@@ -14794,7 +14774,7 @@
         <p:spPr/>
         <p:txBody>
           <a:bodyPr>
-            <a:normAutofit/>
+            <a:normAutofit fontScale="92500"/>
           </a:bodyPr>
           <a:lstStyle/>
           <a:p>
@@ -14807,13 +14787,23 @@
             <a:pPr lvl="1"/>
             <a:r>
               <a:rPr lang="pt-BR" dirty="0"/>
-              <a:t>A extração de dados, copiam ou extraem dados brutos de várias fontes e armazenam na área de preparação onde os dados extraídos são armazenados temporariamente.</a:t>
+              <a:t>A extração de dados, copiam ou extraem dados brutos de várias fontes e armazenam na área de preparação onde os dados extraídos são armazenados temporariamente, </a:t>
+            </a:r>
+            <a:r>
+              <a:rPr lang="pt-BR" dirty="0">
+                <a:effectLst/>
+              </a:rPr>
+              <a:t>isso significa que o conteúdo armazenado é excluído após a conclusão da extração dos dados</a:t>
+            </a:r>
+            <a:r>
+              <a:rPr lang="pt-BR" dirty="0"/>
+              <a:t>.</a:t>
             </a:r>
           </a:p>
           <a:p>
             <a:r>
               <a:rPr lang="pt-BR" dirty="0"/>
-              <a:t>A extração de dados acontece de uma das três maneiras (AWS, 2023).:</a:t>
+              <a:t>A extração de dados acontece de uma das três maneiras:</a:t>
             </a:r>
           </a:p>
           <a:p>
@@ -14951,7 +14941,7 @@
             </a:pPr>
             <a:r>
               <a:rPr lang="pt-BR" dirty="0"/>
-              <a:t>Transformação de dados básica (AWS, 2023) </a:t>
+              <a:t>Transformação de dados básica</a:t>
             </a:r>
           </a:p>
           <a:p>
@@ -14991,7 +14981,7 @@
             </a:pPr>
             <a:r>
               <a:rPr lang="pt-BR" dirty="0"/>
-              <a:t>Transformação de dados avançada (AWS, 2023) </a:t>
+              <a:t>Transformação de dados avançada</a:t>
             </a:r>
           </a:p>
           <a:p>
@@ -15273,8 +15263,8 @@
         </p:nvSpPr>
         <p:spPr>
           <a:xfrm>
-            <a:off x="1141412" y="2249487"/>
-            <a:ext cx="4459287" cy="3965046"/>
+            <a:off x="1141412" y="2161581"/>
+            <a:ext cx="4459287" cy="4052952"/>
           </a:xfrm>
         </p:spPr>
         <p:txBody>
@@ -15289,16 +15279,16 @@
               </a:lnSpc>
             </a:pPr>
             <a:r>
-              <a:rPr lang="pt-BR" sz="1700" dirty="0"/>
+              <a:rPr lang="pt-BR" sz="1800" dirty="0"/>
               <a:t>O carregamento de dados, movem os dados transformados da área de preparação para o data </a:t>
             </a:r>
             <a:r>
-              <a:rPr lang="pt-BR" sz="1700" dirty="0" err="1"/>
+              <a:rPr lang="pt-BR" sz="1800" dirty="0" err="1"/>
               <a:t>warehouse</a:t>
             </a:r>
             <a:r>
-              <a:rPr lang="pt-BR" sz="1700" dirty="0"/>
-              <a:t> de destino (AWS, 2023).</a:t>
+              <a:rPr lang="pt-BR" sz="1800" dirty="0"/>
+              <a:t> de destino.</a:t>
             </a:r>
           </a:p>
           <a:p>
@@ -15308,8 +15298,8 @@
               </a:lnSpc>
             </a:pPr>
             <a:r>
-              <a:rPr lang="pt-BR" sz="1700" dirty="0"/>
-              <a:t>O carregamento de dados tem dois métodos (AWS, 2023):</a:t>
+              <a:rPr lang="pt-BR" sz="1800" dirty="0"/>
+              <a:t>O carregamento de dados tem dois métodos:</a:t>
             </a:r>
           </a:p>
           <a:p>
@@ -15319,7 +15309,7 @@
               </a:lnSpc>
             </a:pPr>
             <a:r>
-              <a:rPr lang="pt-BR" sz="1300" dirty="0"/>
+              <a:rPr lang="pt-BR" sz="1400" dirty="0"/>
               <a:t>Carregamento completo</a:t>
             </a:r>
           </a:p>
@@ -15330,7 +15320,7 @@
               </a:lnSpc>
             </a:pPr>
             <a:r>
-              <a:rPr lang="pt-BR" sz="1300" dirty="0"/>
+              <a:rPr lang="pt-BR" sz="1400" dirty="0"/>
               <a:t>Carregamento Incremental </a:t>
             </a:r>
           </a:p>
@@ -15341,7 +15331,7 @@
               </a:lnSpc>
             </a:pPr>
             <a:r>
-              <a:rPr lang="pt-BR" sz="1500" dirty="0"/>
+              <a:rPr lang="pt-BR" sz="1600" dirty="0"/>
               <a:t>Carregamento incremental por transmissão</a:t>
             </a:r>
           </a:p>
@@ -15352,17 +15342,9 @@
               </a:lnSpc>
             </a:pPr>
             <a:r>
-              <a:rPr lang="pt-BR" sz="1500" dirty="0"/>
+              <a:rPr lang="pt-BR" sz="1600" dirty="0"/>
               <a:t>Carregamento incremental em lotes</a:t>
             </a:r>
-          </a:p>
-          <a:p>
-            <a:pPr>
-              <a:lnSpc>
-                <a:spcPct val="110000"/>
-              </a:lnSpc>
-            </a:pPr>
-            <a:endParaRPr lang="pt-BR" sz="1700" dirty="0"/>
           </a:p>
         </p:txBody>
       </p:sp>
@@ -18012,13 +17994,13 @@
           <a:p>
             <a:r>
               <a:rPr lang="pt-BR" dirty="0"/>
-              <a:t>É um pipeline que a transformação ocorre no armazenamento de dados de destino, sem ter a necessidade de usar um mecanismo de transformação separado. Os recursos de processamento do armazenamento de dados de destino são usados para transformar os dados (MICROSOFT, 2023). </a:t>
+              <a:t>É um pipeline que a transformação ocorre no armazenamento de dados de destino, sem ter a necessidade de usar um mecanismo de transformação separado. Os recursos de processamento do armazenamento de dados de destino são usados para transformar os dados. </a:t>
             </a:r>
           </a:p>
           <a:p>
             <a:r>
               <a:rPr lang="pt-BR" dirty="0"/>
-              <a:t>O processo de ELT se tornou popular com a adoção da infraestrutura em nuvem, que oferece aos bancos de dados de destino o poder de processamento necessário para as transformações (AWS, 2023).</a:t>
+              <a:t>O processo de ELT se tornou popular com a adoção da infraestrutura em nuvem, que oferece aos bancos de dados de destino o poder de processamento necessário para as transformações.</a:t>
             </a:r>
           </a:p>
         </p:txBody>
@@ -18213,7 +18195,7 @@
         <p:spPr>
           <a:xfrm>
             <a:off x="1141413" y="618518"/>
-            <a:ext cx="4459286" cy="1478570"/>
+            <a:ext cx="4459286" cy="1240445"/>
           </a:xfrm>
         </p:spPr>
         <p:txBody>
@@ -18248,8 +18230,8 @@
         </p:nvSpPr>
         <p:spPr>
           <a:xfrm>
-            <a:off x="1141412" y="2249487"/>
-            <a:ext cx="4459287" cy="3965046"/>
+            <a:off x="1141412" y="1988531"/>
+            <a:ext cx="4459287" cy="4226002"/>
           </a:xfrm>
         </p:spPr>
         <p:txBody>
@@ -18259,12 +18241,15 @@
           <a:lstStyle/>
           <a:p>
             <a:r>
-              <a:rPr lang="pt-BR" sz="1600" dirty="0"/>
-              <a:t>Processo mais ágil para o carregamento e o processamento de dados. A sua principal vantagem é que ele permite um processamento de dados mais rápido, pois esses dados são carregados no sistema de destino antes de serem transformados (BLASI, 2020).</a:t>
+              <a:rPr lang="pt-BR" sz="2000" dirty="0"/>
+              <a:t>Assim como no ETL o ELT possui três fases de execução. Extração, Carregamento e Transformação.</a:t>
             </a:r>
           </a:p>
           <a:p>
-            <a:endParaRPr lang="pt-BR" sz="2000" dirty="0"/>
+            <a:r>
+              <a:rPr lang="pt-BR" sz="2000" dirty="0"/>
+              <a:t>Processo mais ágil para o carregamento e o processamento de dados. A sua principal vantagem é que ele permite um processamento de dados mais rápido, pois esses dados são carregados no sistema de destino antes de serem transformados.</a:t>
+            </a:r>
           </a:p>
         </p:txBody>
       </p:sp>
@@ -20876,13 +20861,13 @@
           <a:p>
             <a:r>
               <a:rPr lang="pt-BR" dirty="0"/>
-              <a:t>O ETL se tornou uma parte essencial nos processos de inteligência de negócios, possibilitando assim que dados brutos de diferentes fontes sejam integrados em um único local, para que sejam extraídas as informações necessárias para o negócio. Ao contrário do ETL o ELT, os dados serão integrados primeiramente para que depois sejam convertidos, reduzindo consideravelmente o tempo de carregamento e sendo assim um método mais eficiente em termos de recursos (FÁTIMA, 2020). </a:t>
+              <a:t>O ETL se tornou uma parte essencial nos processos de inteligência de negócios, possibilitando assim que dados brutos de diferentes fontes sejam integrados em um único local, para que sejam extraídas as informações necessárias para o negócio. Ao contrário do ETL o ELT, os dados serão integrados primeiramente para que depois sejam convertidos, reduzindo consideravelmente o tempo de carregamento e sendo assim um método mais eficiente em termos de recursos. </a:t>
             </a:r>
           </a:p>
           <a:p>
             <a:r>
               <a:rPr lang="pt-BR" dirty="0"/>
-              <a:t>O ELT possuí muitos benefícios em relação a escalabilidade e em relação ao processamento e armazenamento em nuvem, cada abordagem oferece vantagens e desvantagens a serem consideradas. A velocidade do ELT, que vai oferecer a possibilidade de carregamento e transformação simultâneos, é um fator predominante em seu favor, se você precisar carregar e analisar grandes quantidades de dados mantendo os dados brutos para futuras análises. Se esse os dados coletados e armazenados, são de um modelo específico que suas fontes raramente possam variar, o ETL será uma melhor opção (SEGNER, 2023). </a:t>
+              <a:t>O ELT possuí muitos benefícios em relação a escalabilidade e em relação ao processamento e armazenamento em nuvem, cada abordagem oferece vantagens e desvantagens a serem consideradas. A velocidade do ELT, que vai oferecer a possibilidade de carregamento e transformação simultâneos, é um fator predominante em seu favor, se você precisar carregar e analisar grandes quantidades de dados mantendo os dados brutos para futuras análises. Se esse os dados coletados e armazenados, são de um modelo específico que suas fontes raramente possam variar, o ETL será uma melhor opção. </a:t>
             </a:r>
           </a:p>
         </p:txBody>
@@ -20901,167 +20886,6 @@
 </file>
 
 <file path=ppt/slides/slide17.xml><?xml version="1.0" encoding="utf-8"?>
-<p:sld xmlns:a="http://schemas.openxmlformats.org/drawingml/2006/main" xmlns:r="http://schemas.openxmlformats.org/officeDocument/2006/relationships" xmlns:p="http://schemas.openxmlformats.org/presentationml/2006/main">
-  <p:cSld>
-    <p:spTree>
-      <p:nvGrpSpPr>
-        <p:cNvPr id="1" name=""/>
-        <p:cNvGrpSpPr/>
-        <p:nvPr/>
-      </p:nvGrpSpPr>
-      <p:grpSpPr>
-        <a:xfrm>
-          <a:off x="0" y="0"/>
-          <a:ext cx="0" cy="0"/>
-          <a:chOff x="0" y="0"/>
-          <a:chExt cx="0" cy="0"/>
-        </a:xfrm>
-      </p:grpSpPr>
-      <p:sp>
-        <p:nvSpPr>
-          <p:cNvPr id="2" name="Título 1">
-            <a:extLst>
-              <a:ext uri="{FF2B5EF4-FFF2-40B4-BE49-F238E27FC236}">
-                <a16:creationId xmlns:a16="http://schemas.microsoft.com/office/drawing/2014/main" id="{8F83F30A-A320-2FF1-BCB5-D51968CD333B}"/>
-              </a:ext>
-            </a:extLst>
-          </p:cNvPr>
-          <p:cNvSpPr>
-            <a:spLocks noGrp="1"/>
-          </p:cNvSpPr>
-          <p:nvPr>
-            <p:ph type="title"/>
-          </p:nvPr>
-        </p:nvSpPr>
-        <p:spPr/>
-        <p:txBody>
-          <a:bodyPr/>
-          <a:lstStyle/>
-          <a:p>
-            <a:r>
-              <a:rPr lang="pt-BR" dirty="0" err="1"/>
-              <a:t>Etl</a:t>
-            </a:r>
-            <a:r>
-              <a:rPr lang="pt-BR" dirty="0"/>
-              <a:t> </a:t>
-            </a:r>
-            <a:r>
-              <a:rPr lang="pt-BR" dirty="0" err="1"/>
-              <a:t>x</a:t>
-            </a:r>
-            <a:r>
-              <a:rPr lang="pt-BR" dirty="0"/>
-              <a:t> </a:t>
-            </a:r>
-            <a:r>
-              <a:rPr lang="pt-BR" dirty="0" err="1"/>
-              <a:t>elt</a:t>
-            </a:r>
-            <a:endParaRPr lang="pt-BR" dirty="0"/>
-          </a:p>
-        </p:txBody>
-      </p:sp>
-      <p:pic>
-        <p:nvPicPr>
-          <p:cNvPr id="4" name="Espaço Reservado para Conteúdo 3">
-            <a:extLst>
-              <a:ext uri="{FF2B5EF4-FFF2-40B4-BE49-F238E27FC236}">
-                <a16:creationId xmlns:a16="http://schemas.microsoft.com/office/drawing/2014/main" id="{A2DC012A-082F-C59F-89CA-306BB7E485FC}"/>
-              </a:ext>
-            </a:extLst>
-          </p:cNvPr>
-          <p:cNvPicPr>
-            <a:picLocks noGrp="1" noChangeAspect="1"/>
-          </p:cNvPicPr>
-          <p:nvPr>
-            <p:ph idx="1"/>
-          </p:nvPr>
-        </p:nvPicPr>
-        <p:blipFill>
-          <a:blip r:embed="rId2">
-            <a:extLst>
-              <a:ext uri="{28A0092B-C50C-407E-A947-70E740481C1C}">
-                <a14:useLocalDpi xmlns:a14="http://schemas.microsoft.com/office/drawing/2010/main" val="0"/>
-              </a:ext>
-            </a:extLst>
-          </a:blip>
-          <a:srcRect/>
-          <a:stretch>
-            <a:fillRect/>
-          </a:stretch>
-        </p:blipFill>
-        <p:spPr bwMode="auto">
-          <a:xfrm>
-            <a:off x="1560513" y="2337594"/>
-            <a:ext cx="9067800" cy="3365500"/>
-          </a:xfrm>
-          <a:prstGeom prst="rect">
-            <a:avLst/>
-          </a:prstGeom>
-          <a:noFill/>
-          <a:ln>
-            <a:noFill/>
-          </a:ln>
-        </p:spPr>
-      </p:pic>
-      <p:sp>
-        <p:nvSpPr>
-          <p:cNvPr id="6" name="CaixaDeTexto 5">
-            <a:extLst>
-              <a:ext uri="{FF2B5EF4-FFF2-40B4-BE49-F238E27FC236}">
-                <a16:creationId xmlns:a16="http://schemas.microsoft.com/office/drawing/2014/main" id="{0ADC7E61-9B29-9A8C-B212-49ADC3856606}"/>
-              </a:ext>
-            </a:extLst>
-          </p:cNvPr>
-          <p:cNvSpPr txBox="1"/>
-          <p:nvPr/>
-        </p:nvSpPr>
-        <p:spPr>
-          <a:xfrm>
-            <a:off x="1560513" y="5703094"/>
-            <a:ext cx="6100174" cy="369332"/>
-          </a:xfrm>
-          <a:prstGeom prst="rect">
-            <a:avLst/>
-          </a:prstGeom>
-          <a:noFill/>
-        </p:spPr>
-        <p:txBody>
-          <a:bodyPr wrap="square">
-            <a:spAutoFit/>
-          </a:bodyPr>
-          <a:lstStyle/>
-          <a:p>
-            <a:r>
-              <a:rPr lang="pt-BR" dirty="0"/>
-              <a:t>Fonte </a:t>
-            </a:r>
-            <a:r>
-              <a:rPr lang="pt-BR" dirty="0" err="1"/>
-              <a:t>Pauncz</a:t>
-            </a:r>
-            <a:r>
-              <a:rPr lang="pt-BR" dirty="0"/>
-              <a:t> (2021). Acesso em 24/04/2023</a:t>
-            </a:r>
-          </a:p>
-        </p:txBody>
-      </p:sp>
-    </p:spTree>
-    <p:extLst>
-      <p:ext uri="{BB962C8B-B14F-4D97-AF65-F5344CB8AC3E}">
-        <p14:creationId xmlns:p14="http://schemas.microsoft.com/office/powerpoint/2010/main" val="204644458"/>
-      </p:ext>
-    </p:extLst>
-  </p:cSld>
-  <p:clrMapOvr>
-    <a:masterClrMapping/>
-  </p:clrMapOvr>
-</p:sld>
-</file>
-
-<file path=ppt/slides/slide18.xml><?xml version="1.0" encoding="utf-8"?>
 <p:sld xmlns:a="http://schemas.openxmlformats.org/drawingml/2006/main" xmlns:r="http://schemas.openxmlformats.org/officeDocument/2006/relationships" xmlns:p="http://schemas.openxmlformats.org/presentationml/2006/main">
   <p:cSld>
     <p:spTree>
@@ -21149,7 +20973,7 @@
             </a:pPr>
             <a:r>
               <a:rPr lang="pt-BR" dirty="0"/>
-              <a:t>O ETL equilibra a capacidade e compartilhar o trabalho com o sistema de gerenciamento de banco de dados relacional (FÁTIMA, 2020).</a:t>
+              <a:t>O ETL equilibra a capacidade e compartilhar o trabalho com o sistema de gerenciamento de banco de dados relacional).</a:t>
             </a:r>
           </a:p>
           <a:p>
@@ -21159,7 +20983,7 @@
             </a:pPr>
             <a:r>
               <a:rPr lang="pt-BR" dirty="0"/>
-              <a:t>Ao utilizar mapas de dados, o ETL executa operações mais complexas em um único diagrama de fluxo de dados (FÁTIMA, 2020).</a:t>
+              <a:t>Ao utilizar mapas de dados, o ETL executa operações mais complexas em um único diagrama de fluxo de dados.</a:t>
             </a:r>
           </a:p>
           <a:p>
@@ -21169,7 +20993,7 @@
             </a:pPr>
             <a:r>
               <a:rPr lang="pt-BR" dirty="0"/>
-              <a:t>Processa os dados transmitidas da origem e carrega no destino em lotes (FÁTIMA, 2020).</a:t>
+              <a:t>Processa os dados transmitidas da origem e carrega no destino em lotes.</a:t>
             </a:r>
           </a:p>
           <a:p>
@@ -21179,7 +21003,7 @@
             </a:pPr>
             <a:r>
               <a:rPr lang="pt-BR" dirty="0"/>
-              <a:t>Preserva as plataformas de fonte de dados atuais sem se preocupar com a sincronização de dados (FÁTIMA, 2020).</a:t>
+              <a:t>Preserva as plataformas de fonte de dados atuais sem se preocupar com a sincronização de dados.</a:t>
             </a:r>
           </a:p>
           <a:p>
@@ -21189,7 +21013,7 @@
             </a:pPr>
             <a:r>
               <a:rPr lang="pt-BR" dirty="0"/>
-              <a:t>O ETL transfere apenas dados que já foram transformados, com isso pode haver uma economia nos custos de armazenamento armazenando apenas os dados necessários (PAUNCZ, 2021).</a:t>
+              <a:t>O ETL transfere apenas dados que já foram transformados, com isso pode haver uma economia nos custos de armazenamento armazenando apenas os dados necessários.</a:t>
             </a:r>
           </a:p>
           <a:p>
@@ -21207,7 +21031,7 @@
             </a:r>
             <a:r>
               <a:rPr lang="pt-BR" dirty="0"/>
-              <a:t> (IBM, 2021).</a:t>
+              <a:t>.</a:t>
             </a:r>
           </a:p>
           <a:p>
@@ -21217,7 +21041,7 @@
             </a:pPr>
             <a:r>
               <a:rPr lang="pt-BR" dirty="0"/>
-              <a:t>Segurança e conformidade na criptografia de dados confidenciais (IBM, 2021).</a:t>
+              <a:t>Segurança e conformidade na criptografia de dados confidenciais.</a:t>
             </a:r>
           </a:p>
           <a:p>
@@ -21241,8 +21065,8 @@
         </p:nvSpPr>
         <p:spPr>
           <a:xfrm>
-            <a:off x="6094412" y="2376835"/>
-            <a:ext cx="4952999" cy="3541714"/>
+            <a:off x="6094412" y="2249487"/>
+            <a:ext cx="4952999" cy="3669062"/>
           </a:xfrm>
           <a:prstGeom prst="rect">
             <a:avLst/>
@@ -21250,7 +21074,7 @@
         </p:spPr>
         <p:txBody>
           <a:bodyPr vert="horz" lIns="91440" tIns="45720" rIns="91440" bIns="45720" rtlCol="0">
-            <a:normAutofit fontScale="55000" lnSpcReduction="20000"/>
+            <a:normAutofit fontScale="62500" lnSpcReduction="20000"/>
           </a:bodyPr>
           <a:lstStyle>
             <a:lvl1pPr marL="228600" indent="-228600" algn="l" defTabSz="914400" rtl="0" eaLnBrk="1" latinLnBrk="0" hangingPunct="1">
@@ -21449,7 +21273,7 @@
             </a:r>
             <a:r>
               <a:rPr lang="pt-BR" dirty="0"/>
-              <a:t> (FÁTIMA, 2020).</a:t>
+              <a:t>.</a:t>
             </a:r>
           </a:p>
           <a:p>
@@ -21459,7 +21283,7 @@
             </a:pPr>
             <a:r>
               <a:rPr lang="pt-BR" dirty="0"/>
-              <a:t>O processamento das informações linha a linha poderá diminuir o desempenho do processo de ETL (FÁTIMA, 2020).</a:t>
+              <a:t>O processamento das informações linha a linha poderá diminuir o desempenho do processo de ETL.</a:t>
             </a:r>
           </a:p>
           <a:p>
@@ -21469,7 +21293,7 @@
             </a:pPr>
             <a:r>
               <a:rPr lang="pt-BR" dirty="0"/>
-              <a:t>Os dados necessitam ser transferidos para uma camada adicional antes de chegarem ao destino (FÁTIMA, 2020).</a:t>
+              <a:t>Os dados necessitam ser transferidos para uma camada adicional antes de chegarem ao destino.</a:t>
             </a:r>
           </a:p>
           <a:p>
@@ -21479,7 +21303,7 @@
             </a:pPr>
             <a:r>
               <a:rPr lang="pt-BR" dirty="0"/>
-              <a:t>O processo necessita de atualizações periódicas ao invés de atualizações em tempo real (IBM, 2021).</a:t>
+              <a:t>O processo necessita de atualizações periódicas ao invés de atualizações em tempo real.</a:t>
             </a:r>
           </a:p>
           <a:p>
@@ -21489,7 +21313,7 @@
             </a:pPr>
             <a:r>
               <a:rPr lang="pt-BR" dirty="0"/>
-              <a:t>Tempo mais longo de carregamento devido ao grande número de etapas no estágio de transformação (IBM, 2021).</a:t>
+              <a:t>Tempo mais longo de carregamento devido ao grande número de etapas no estágio de transformação.</a:t>
             </a:r>
           </a:p>
           <a:p>
@@ -21499,7 +21323,7 @@
             </a:pPr>
             <a:r>
               <a:rPr lang="pt-BR" dirty="0"/>
-              <a:t>Maior tempo de desenvolvimento (IBM, 2021).</a:t>
+              <a:t>Maior tempo de desenvolvimento.</a:t>
             </a:r>
           </a:p>
         </p:txBody>
@@ -21517,7 +21341,7 @@
 </p:sld>
 </file>
 
-<file path=ppt/slides/slide19.xml><?xml version="1.0" encoding="utf-8"?>
+<file path=ppt/slides/slide18.xml><?xml version="1.0" encoding="utf-8"?>
 <p:sld xmlns:a="http://schemas.openxmlformats.org/drawingml/2006/main" xmlns:r="http://schemas.openxmlformats.org/officeDocument/2006/relationships" xmlns:p="http://schemas.openxmlformats.org/presentationml/2006/main">
   <p:cSld>
     <p:spTree>
@@ -21605,7 +21429,7 @@
             </a:pPr>
             <a:r>
               <a:rPr lang="pt-BR" dirty="0"/>
-              <a:t>Necessita de menos tempo e recursos, pois os dados serão transformados e carregados em paralelo (FÁTIMA, 2020).</a:t>
+              <a:t>Necessita de menos tempo e recursos, pois os dados serão transformados e carregados em paralelo.</a:t>
             </a:r>
           </a:p>
           <a:p>
@@ -21615,7 +21439,7 @@
             </a:pPr>
             <a:r>
               <a:rPr lang="pt-BR" dirty="0"/>
-              <a:t>Permite dados de tamanho maiores (FÁTIMA, 2020).</a:t>
+              <a:t>Permite dados de tamanho maiores.</a:t>
             </a:r>
           </a:p>
           <a:p>
@@ -21625,7 +21449,7 @@
             </a:pPr>
             <a:r>
               <a:rPr lang="pt-BR" dirty="0"/>
-              <a:t>Não necessita de um bloco de transformação, pois o sistema de destino que realiza esse trabalho (FÁTIMA, 2020).</a:t>
+              <a:t>Não necessita de um bloco de transformação, pois o sistema de destino que realiza esse trabalho.</a:t>
             </a:r>
           </a:p>
           <a:p>
@@ -21635,7 +21459,7 @@
             </a:pPr>
             <a:r>
               <a:rPr lang="pt-BR" dirty="0"/>
-              <a:t>Maior flexibilidade, não exigindo o desenvolvimento de pipelines complexos (PAUNCZ, 2021).</a:t>
+              <a:t>Maior flexibilidade, não exigindo o desenvolvimento de pipelines complexos.</a:t>
             </a:r>
           </a:p>
           <a:p>
@@ -21645,7 +21469,7 @@
             </a:pPr>
             <a:r>
               <a:rPr lang="pt-BR" dirty="0"/>
-              <a:t>A transformação de dados é realizada apenas para os dados necessários para que seja realizada uma análise específica (PAUNCZ, 2021).</a:t>
+              <a:t>A transformação de dados é realizada apenas para os dados necessários para que seja realizada uma análise específica.</a:t>
             </a:r>
           </a:p>
           <a:p>
@@ -21655,7 +21479,7 @@
             </a:pPr>
             <a:r>
               <a:rPr lang="pt-BR" dirty="0"/>
-              <a:t>Implementação mais rápida (IBM, 2021).</a:t>
+              <a:t>Implementação mais rápida.</a:t>
             </a:r>
           </a:p>
           <a:p>
@@ -21665,7 +21489,7 @@
             </a:pPr>
             <a:r>
               <a:rPr lang="pt-BR" dirty="0"/>
-              <a:t>Utilização de sistemas de armazenamento em nuvem (IBM, 2021).</a:t>
+              <a:t>Utilização de sistemas de armazenamento em nuvem.</a:t>
             </a:r>
           </a:p>
           <a:p>
@@ -21675,7 +21499,7 @@
             </a:pPr>
             <a:r>
               <a:rPr lang="pt-BR" dirty="0"/>
-              <a:t>Suporte a tipos de dados estruturados, não estruturados, semiestruturados e brutos (IBM, 2021).</a:t>
+              <a:t>Suporte a tipos de dados estruturados, não estruturados, semiestruturados e brutos.</a:t>
             </a:r>
           </a:p>
           <a:p>
@@ -21699,8 +21523,8 @@
         </p:nvSpPr>
         <p:spPr>
           <a:xfrm>
-            <a:off x="6094412" y="2376835"/>
-            <a:ext cx="4952999" cy="3541714"/>
+            <a:off x="6094412" y="2249487"/>
+            <a:ext cx="4952999" cy="3669062"/>
           </a:xfrm>
           <a:prstGeom prst="rect">
             <a:avLst/>
@@ -21899,7 +21723,7 @@
             </a:pPr>
             <a:r>
               <a:rPr lang="pt-BR" dirty="0"/>
-              <a:t>Limitação nas ferramentas que oferecem suporte para o ELT (FÁTIMA, 2020).</a:t>
+              <a:t>Limitação nas ferramentas que oferecem suporte para o ELT.</a:t>
             </a:r>
           </a:p>
           <a:p>
@@ -21909,7 +21733,7 @@
             </a:pPr>
             <a:r>
               <a:rPr lang="pt-BR" dirty="0"/>
-              <a:t>Falta de modularidade devido ao design baseado em conjunto (FÁTIMA, 2020).</a:t>
+              <a:t>Falta de modularidade devido ao design baseado em conjunto.</a:t>
             </a:r>
           </a:p>
           <a:p>
@@ -21919,7 +21743,7 @@
             </a:pPr>
             <a:r>
               <a:rPr lang="pt-BR" dirty="0"/>
-              <a:t>O carregamento de dados confidenciais antes de transformá-los, expõe os dados privados em logs acessíveis aos administradores do sistema (PAUNCZ, 2021).</a:t>
+              <a:t>O carregamento de dados confidenciais antes de transformá-los, expõe os dados privados em logs acessíveis aos administradores do sistema.</a:t>
             </a:r>
           </a:p>
           <a:p>
@@ -21929,7 +21753,7 @@
             </a:pPr>
             <a:r>
               <a:rPr lang="pt-BR" dirty="0"/>
-              <a:t>A evolução recente causa uma falta de confiança nas ferramentas de ELT em relação as de ETL (PAUNCZ, 2021).</a:t>
+              <a:t>A evolução recente causa uma falta de confiança nas ferramentas de ELT em relação as de ETL.</a:t>
             </a:r>
           </a:p>
           <a:p>
@@ -21939,7 +21763,7 @@
             </a:pPr>
             <a:r>
               <a:rPr lang="pt-BR" dirty="0"/>
-              <a:t>Demanda uma maior quantidade de armazenamento (BLASI, 2020).</a:t>
+              <a:t>Demanda uma maior quantidade de armazenamento.</a:t>
             </a:r>
           </a:p>
           <a:p>
@@ -21963,112 +21787,7 @@
 </p:sld>
 </file>
 
-<file path=ppt/slides/slide2.xml><?xml version="1.0" encoding="utf-8"?>
-<p:sld xmlns:a="http://schemas.openxmlformats.org/drawingml/2006/main" xmlns:r="http://schemas.openxmlformats.org/officeDocument/2006/relationships" xmlns:p="http://schemas.openxmlformats.org/presentationml/2006/main">
-  <p:cSld>
-    <p:spTree>
-      <p:nvGrpSpPr>
-        <p:cNvPr id="1" name=""/>
-        <p:cNvGrpSpPr/>
-        <p:nvPr/>
-      </p:nvGrpSpPr>
-      <p:grpSpPr>
-        <a:xfrm>
-          <a:off x="0" y="0"/>
-          <a:ext cx="0" cy="0"/>
-          <a:chOff x="0" y="0"/>
-          <a:chExt cx="0" cy="0"/>
-        </a:xfrm>
-      </p:grpSpPr>
-      <p:sp>
-        <p:nvSpPr>
-          <p:cNvPr id="2" name="Título 1">
-            <a:extLst>
-              <a:ext uri="{FF2B5EF4-FFF2-40B4-BE49-F238E27FC236}">
-                <a16:creationId xmlns:a16="http://schemas.microsoft.com/office/drawing/2014/main" id="{57CC37A6-AA5F-3E69-3449-90CBA824792B}"/>
-              </a:ext>
-            </a:extLst>
-          </p:cNvPr>
-          <p:cNvSpPr>
-            <a:spLocks noGrp="1"/>
-          </p:cNvSpPr>
-          <p:nvPr>
-            <p:ph type="title"/>
-          </p:nvPr>
-        </p:nvSpPr>
-        <p:spPr/>
-        <p:txBody>
-          <a:bodyPr/>
-          <a:lstStyle/>
-          <a:p>
-            <a:r>
-              <a:rPr lang="pt-BR" dirty="0"/>
-              <a:t>introdução</a:t>
-            </a:r>
-          </a:p>
-        </p:txBody>
-      </p:sp>
-      <p:sp>
-        <p:nvSpPr>
-          <p:cNvPr id="3" name="Espaço Reservado para Conteúdo 2">
-            <a:extLst>
-              <a:ext uri="{FF2B5EF4-FFF2-40B4-BE49-F238E27FC236}">
-                <a16:creationId xmlns:a16="http://schemas.microsoft.com/office/drawing/2014/main" id="{6CD5CC7C-086C-FE5C-7E17-8E0BDA237EF4}"/>
-              </a:ext>
-            </a:extLst>
-          </p:cNvPr>
-          <p:cNvSpPr>
-            <a:spLocks noGrp="1"/>
-          </p:cNvSpPr>
-          <p:nvPr>
-            <p:ph idx="1"/>
-          </p:nvPr>
-        </p:nvSpPr>
-        <p:spPr/>
-        <p:txBody>
-          <a:bodyPr>
-            <a:normAutofit lnSpcReduction="10000"/>
-          </a:bodyPr>
-          <a:lstStyle/>
-          <a:p>
-            <a:r>
-              <a:rPr lang="pt-BR" dirty="0"/>
-              <a:t>Com a explosão da quantidade de dados gerados, esse grande volume de informações conhecido como Big Data, tem o potencial de fornecer insights e melhorar a tomada de decisão em organizações. No entanto, para que os dados sejam uteis é preciso que eles sejam coletados, armazenados e processados de maneira adequada (Silva,2022).</a:t>
-            </a:r>
-          </a:p>
-          <a:p>
-            <a:r>
-              <a:rPr lang="pt-BR" dirty="0"/>
-              <a:t>Para realizar o tratamento desses dados surgiram tecnologias como Data </a:t>
-            </a:r>
-            <a:r>
-              <a:rPr lang="pt-BR" dirty="0" err="1"/>
-              <a:t>Warehouse</a:t>
-            </a:r>
-            <a:r>
-              <a:rPr lang="pt-BR" dirty="0"/>
-              <a:t> e o Data Lake e os processos de extração ETL e ELT( MICROSOFT, 2023).</a:t>
-            </a:r>
-          </a:p>
-          <a:p>
-            <a:endParaRPr lang="pt-BR" dirty="0"/>
-          </a:p>
-        </p:txBody>
-      </p:sp>
-    </p:spTree>
-    <p:extLst>
-      <p:ext uri="{BB962C8B-B14F-4D97-AF65-F5344CB8AC3E}">
-        <p14:creationId xmlns:p14="http://schemas.microsoft.com/office/powerpoint/2010/main" val="3690054828"/>
-      </p:ext>
-    </p:extLst>
-  </p:cSld>
-  <p:clrMapOvr>
-    <a:masterClrMapping/>
-  </p:clrMapOvr>
-</p:sld>
-</file>
-
-<file path=ppt/slides/slide20.xml><?xml version="1.0" encoding="utf-8"?>
+<file path=ppt/slides/slide19.xml><?xml version="1.0" encoding="utf-8"?>
 <p:sld xmlns:a="http://schemas.openxmlformats.org/drawingml/2006/main" xmlns:r="http://schemas.openxmlformats.org/officeDocument/2006/relationships" xmlns:p="http://schemas.openxmlformats.org/presentationml/2006/main">
   <p:cSld>
     <p:spTree>
@@ -22129,7 +21848,7 @@
             <p:ph idx="1"/>
             <p:extLst>
               <p:ext uri="{D42A27DB-BD31-4B8C-83A1-F6EECF244321}">
-                <p14:modId xmlns:p14="http://schemas.microsoft.com/office/powerpoint/2010/main" val="980437174"/>
+                <p14:modId xmlns:p14="http://schemas.microsoft.com/office/powerpoint/2010/main" val="2663426166"/>
               </p:ext>
             </p:extLst>
           </p:nvPr>
@@ -22603,7 +22322,7 @@
                     <a:bodyPr/>
                     <a:lstStyle/>
                     <a:p>
-                      <a:pPr>
+                      <a:pPr algn="l">
                         <a:lnSpc>
                           <a:spcPct val="150000"/>
                         </a:lnSpc>
@@ -22612,28 +22331,12 @@
                         </a:spcAft>
                       </a:pPr>
                       <a:r>
-                        <a:rPr lang="pt-BR" sz="900">
+                        <a:rPr lang="pt-BR" sz="900" dirty="0">
                           <a:effectLst/>
                         </a:rPr>
-                        <a:t> </a:t>
+                        <a:t> Estruturada</a:t>
                       </a:r>
-                    </a:p>
-                    <a:p>
-                      <a:pPr algn="ctr">
-                        <a:lnSpc>
-                          <a:spcPct val="150000"/>
-                        </a:lnSpc>
-                        <a:spcAft>
-                          <a:spcPts val="1000"/>
-                        </a:spcAft>
-                      </a:pPr>
-                      <a:r>
-                        <a:rPr lang="pt-BR" sz="900">
-                          <a:effectLst/>
-                        </a:rPr>
-                        <a:t>Estruturada</a:t>
-                      </a:r>
-                      <a:endParaRPr lang="pt-BR" sz="900">
+                      <a:endParaRPr lang="pt-BR" sz="900" dirty="0">
                         <a:effectLst/>
                         <a:latin typeface="Calibri" panose="020F0502020204030204" pitchFamily="34" charset="0"/>
                         <a:ea typeface="Calibri" panose="020F0502020204030204" pitchFamily="34" charset="0"/>
@@ -22719,12 +22422,12 @@
                         </a:spcAft>
                       </a:pPr>
                       <a:r>
-                        <a:rPr lang="pt-BR" sz="900">
+                        <a:rPr lang="pt-BR" sz="900" dirty="0">
                           <a:effectLst/>
                         </a:rPr>
                         <a:t>Mais adequado para conjuntos de dados menores que requerem transformação complexa</a:t>
                       </a:r>
-                      <a:endParaRPr lang="pt-BR" sz="900">
+                      <a:endParaRPr lang="pt-BR" sz="900" dirty="0">
                         <a:effectLst/>
                         <a:latin typeface="Calibri" panose="020F0502020204030204" pitchFamily="34" charset="0"/>
                         <a:ea typeface="Calibri" panose="020F0502020204030204" pitchFamily="34" charset="0"/>
@@ -22810,12 +22513,24 @@
                         </a:spcAft>
                       </a:pPr>
                       <a:r>
-                        <a:rPr lang="pt-BR" sz="900">
+                        <a:rPr lang="pt-BR" sz="900" dirty="0">
                           <a:effectLst/>
                         </a:rPr>
-                        <a:t>a transformação de pré-carregamento pode abordar questões de privacidade</a:t>
+                        <a:t>a transformação de </a:t>
                       </a:r>
-                      <a:endParaRPr lang="pt-BR" sz="900">
+                      <a:r>
+                        <a:rPr lang="pt-BR" sz="900" dirty="0" err="1">
+                          <a:effectLst/>
+                        </a:rPr>
+                        <a:t>pré-carregamento</a:t>
+                      </a:r>
+                      <a:r>
+                        <a:rPr lang="pt-BR" sz="900" dirty="0">
+                          <a:effectLst/>
+                        </a:rPr>
+                        <a:t> pode abordar questões de privacidade</a:t>
+                      </a:r>
+                      <a:endParaRPr lang="pt-BR" sz="900" dirty="0">
                         <a:effectLst/>
                         <a:latin typeface="Calibri" panose="020F0502020204030204" pitchFamily="34" charset="0"/>
                         <a:ea typeface="Calibri" panose="020F0502020204030204" pitchFamily="34" charset="0"/>
@@ -22864,7 +22579,7 @@
                     <a:bodyPr/>
                     <a:lstStyle/>
                     <a:p>
-                      <a:pPr>
+                      <a:pPr algn="ctr">
                         <a:lnSpc>
                           <a:spcPct val="150000"/>
                         </a:lnSpc>
@@ -22873,12 +22588,12 @@
                         </a:spcAft>
                       </a:pPr>
                       <a:r>
-                        <a:rPr lang="pt-BR" sz="900">
+                        <a:rPr lang="pt-BR" sz="900" dirty="0">
                           <a:effectLst/>
                         </a:rPr>
                         <a:t>Compatibilidade do Data Lake </a:t>
                       </a:r>
-                      <a:endParaRPr lang="pt-BR" sz="900">
+                      <a:endParaRPr lang="pt-BR" sz="900" dirty="0">
                         <a:effectLst/>
                         <a:latin typeface="Calibri" panose="020F0502020204030204" pitchFamily="34" charset="0"/>
                         <a:ea typeface="Calibri" panose="020F0502020204030204" pitchFamily="34" charset="0"/>
@@ -23009,7 +22724,104 @@
 </p:sld>
 </file>
 
-<file path=ppt/slides/slide21.xml><?xml version="1.0" encoding="utf-8"?>
+<file path=ppt/slides/slide2.xml><?xml version="1.0" encoding="utf-8"?>
+<p:sld xmlns:a="http://schemas.openxmlformats.org/drawingml/2006/main" xmlns:r="http://schemas.openxmlformats.org/officeDocument/2006/relationships" xmlns:p="http://schemas.openxmlformats.org/presentationml/2006/main">
+  <p:cSld>
+    <p:spTree>
+      <p:nvGrpSpPr>
+        <p:cNvPr id="1" name=""/>
+        <p:cNvGrpSpPr/>
+        <p:nvPr/>
+      </p:nvGrpSpPr>
+      <p:grpSpPr>
+        <a:xfrm>
+          <a:off x="0" y="0"/>
+          <a:ext cx="0" cy="0"/>
+          <a:chOff x="0" y="0"/>
+          <a:chExt cx="0" cy="0"/>
+        </a:xfrm>
+      </p:grpSpPr>
+      <p:sp>
+        <p:nvSpPr>
+          <p:cNvPr id="2" name="Título 1">
+            <a:extLst>
+              <a:ext uri="{FF2B5EF4-FFF2-40B4-BE49-F238E27FC236}">
+                <a16:creationId xmlns:a16="http://schemas.microsoft.com/office/drawing/2014/main" id="{57CC37A6-AA5F-3E69-3449-90CBA824792B}"/>
+              </a:ext>
+            </a:extLst>
+          </p:cNvPr>
+          <p:cNvSpPr>
+            <a:spLocks noGrp="1"/>
+          </p:cNvSpPr>
+          <p:nvPr>
+            <p:ph type="title"/>
+          </p:nvPr>
+        </p:nvSpPr>
+        <p:spPr/>
+        <p:txBody>
+          <a:bodyPr/>
+          <a:lstStyle/>
+          <a:p>
+            <a:r>
+              <a:rPr lang="pt-BR" dirty="0"/>
+              <a:t>introdução</a:t>
+            </a:r>
+          </a:p>
+        </p:txBody>
+      </p:sp>
+      <p:sp>
+        <p:nvSpPr>
+          <p:cNvPr id="3" name="Espaço Reservado para Conteúdo 2">
+            <a:extLst>
+              <a:ext uri="{FF2B5EF4-FFF2-40B4-BE49-F238E27FC236}">
+                <a16:creationId xmlns:a16="http://schemas.microsoft.com/office/drawing/2014/main" id="{6CD5CC7C-086C-FE5C-7E17-8E0BDA237EF4}"/>
+              </a:ext>
+            </a:extLst>
+          </p:cNvPr>
+          <p:cNvSpPr>
+            <a:spLocks noGrp="1"/>
+          </p:cNvSpPr>
+          <p:nvPr>
+            <p:ph idx="1"/>
+          </p:nvPr>
+        </p:nvSpPr>
+        <p:spPr/>
+        <p:txBody>
+          <a:bodyPr>
+            <a:normAutofit/>
+          </a:bodyPr>
+          <a:lstStyle/>
+          <a:p>
+            <a:r>
+              <a:rPr lang="pt-BR" dirty="0"/>
+              <a:t>Com a explosão da quantidade de dados gerados, esse grande volume de informações conhecido como Big Data, tem o potencial de fornecer insights e melhorar a tomada de decisão em organizações. No entanto, para que os dados sejam uteis é preciso que eles sejam coletados, armazenados e processados de maneira adequada.</a:t>
+            </a:r>
+          </a:p>
+          <a:p>
+            <a:r>
+              <a:rPr lang="pt-BR" dirty="0"/>
+              <a:t>Para realizar o tratamento desses dados surgiram tecnologias como Data Warehouse e o Data Lake e os processos de extração ETL e ELT.</a:t>
+            </a:r>
+          </a:p>
+          <a:p>
+            <a:endParaRPr lang="pt-BR" dirty="0"/>
+          </a:p>
+        </p:txBody>
+      </p:sp>
+    </p:spTree>
+    <p:extLst>
+      <p:ext uri="{BB962C8B-B14F-4D97-AF65-F5344CB8AC3E}">
+        <p14:creationId xmlns:p14="http://schemas.microsoft.com/office/powerpoint/2010/main" val="3690054828"/>
+      </p:ext>
+    </p:extLst>
+  </p:cSld>
+  <p:clrMapOvr>
+    <a:masterClrMapping/>
+  </p:clrMapOvr>
+</p:sld>
+</file>
+
+<file path=ppt/slides/slide20.xml><?xml version="1.0" encoding="utf-8"?>
 <p:sld xmlns:a="http://schemas.openxmlformats.org/drawingml/2006/main" xmlns:r="http://schemas.openxmlformats.org/officeDocument/2006/relationships" xmlns:p="http://schemas.openxmlformats.org/presentationml/2006/main">
   <p:cSld>
     <p:spTree>
@@ -23073,19 +22885,22 @@
         <p:spPr/>
         <p:txBody>
           <a:bodyPr>
-            <a:normAutofit fontScale="70000" lnSpcReduction="20000"/>
+            <a:normAutofit/>
           </a:bodyPr>
           <a:lstStyle/>
           <a:p>
             <a:r>
-              <a:rPr lang="pt-BR" dirty="0"/>
-              <a:t>Quando a abordagem de ETL foi criada, o custo do armazenamento de dados em repositórios era muito elevado, além desse custo o seu processamento era extremamente lento e devido a isso não havia tanto investimento nessas tecnologias. Com a inclusão da computação na nuvem, os processos ganharam velocidade e tiveram os seus custos reduzidos. Considerando o grande volume de dados para a serem processados, muitas empresas têm optado pelo ELT em relação ao ETL, buscando uma maior flexibilidade e agilidade (BLASI, 2020).</a:t>
+              <a:rPr lang="pt-BR" sz="1600" dirty="0">
+                <a:effectLst/>
+              </a:rPr>
+              <a:t>O ETL é um paradigma clássico, funcionando com infraestruturas convencionais de data center, que estão em processo de substituição por tecnologias de nuvem. Com uma infraestrutura já existente ou para implantações muito especificas, algumas empresas optam pela utilização do ETL. O ELT faz uso eficaz das tecnologias de nuvem, tornando-o assim o futuro do armazenamento de dados. Ele fornece informações relevantes que ajudam na tomada de decisões, possibilitando que empresas analisem grandes conjuntos de dados com menos manutenção. Com o avanço das ferramentas de integração de dados, o ELT tende a se expandir.</a:t>
             </a:r>
+            <a:endParaRPr lang="pt-BR" sz="1600" dirty="0"/>
           </a:p>
           <a:p>
             <a:r>
-              <a:rPr lang="pt-BR" dirty="0"/>
-              <a:t>O ELT será mais bem aproveitado em conjuntos de dados de alto volume ou em ambientes de uso de dados em tempo real. Enquanto o ETL é mais bem utilizado na sincronização de vários ambientes de dados e na migração de sistemas legados (IBM, 2021). Para transformações que sejam intensivas e que não há um alto grau de variabilidade, dados que contenham informações pessoais ou sistemas legados, o ETL continua sendo a principal escolha, diante da recente evolução do ELT (SEGNER, 2023).</a:t>
+              <a:rPr lang="pt-BR" sz="1600" dirty="0"/>
+              <a:t>O ELT será mais bem aproveitado em conjuntos de dados de alto volume ou em ambientes de uso de dados em tempo real. Enquanto o ETL é mais bem utilizado na sincronização de vários ambientes de dados e na migração de sistemas legados. Para transformações que sejam intensivas e que não há um alto grau de variabilidade, dados que contenham informações pessoais ou sistemas legados, o ETL continua sendo a principal escolha, diante da recente evolução do ELT.</a:t>
             </a:r>
           </a:p>
           <a:p>
@@ -23097,639 +22912,6 @@
     <p:extLst>
       <p:ext uri="{BB962C8B-B14F-4D97-AF65-F5344CB8AC3E}">
         <p14:creationId xmlns:p14="http://schemas.microsoft.com/office/powerpoint/2010/main" val="3250625787"/>
-      </p:ext>
-    </p:extLst>
-  </p:cSld>
-  <p:clrMapOvr>
-    <a:masterClrMapping/>
-  </p:clrMapOvr>
-</p:sld>
-</file>
-
-<file path=ppt/slides/slide22.xml><?xml version="1.0" encoding="utf-8"?>
-<p:sld xmlns:a="http://schemas.openxmlformats.org/drawingml/2006/main" xmlns:r="http://schemas.openxmlformats.org/officeDocument/2006/relationships" xmlns:p="http://schemas.openxmlformats.org/presentationml/2006/main">
-  <p:cSld>
-    <p:spTree>
-      <p:nvGrpSpPr>
-        <p:cNvPr id="1" name=""/>
-        <p:cNvGrpSpPr/>
-        <p:nvPr/>
-      </p:nvGrpSpPr>
-      <p:grpSpPr>
-        <a:xfrm>
-          <a:off x="0" y="0"/>
-          <a:ext cx="0" cy="0"/>
-          <a:chOff x="0" y="0"/>
-          <a:chExt cx="0" cy="0"/>
-        </a:xfrm>
-      </p:grpSpPr>
-      <p:sp>
-        <p:nvSpPr>
-          <p:cNvPr id="2" name="Título 1">
-            <a:extLst>
-              <a:ext uri="{FF2B5EF4-FFF2-40B4-BE49-F238E27FC236}">
-                <a16:creationId xmlns:a16="http://schemas.microsoft.com/office/drawing/2014/main" id="{88D6DAA4-1BDD-7F00-7EA8-AA79281569FA}"/>
-              </a:ext>
-            </a:extLst>
-          </p:cNvPr>
-          <p:cNvSpPr>
-            <a:spLocks noGrp="1"/>
-          </p:cNvSpPr>
-          <p:nvPr>
-            <p:ph type="title"/>
-          </p:nvPr>
-        </p:nvSpPr>
-        <p:spPr/>
-        <p:txBody>
-          <a:bodyPr/>
-          <a:lstStyle/>
-          <a:p>
-            <a:r>
-              <a:rPr lang="pt-BR" dirty="0"/>
-              <a:t>referências</a:t>
-            </a:r>
-          </a:p>
-        </p:txBody>
-      </p:sp>
-      <p:sp>
-        <p:nvSpPr>
-          <p:cNvPr id="3" name="Espaço Reservado para Conteúdo 2">
-            <a:extLst>
-              <a:ext uri="{FF2B5EF4-FFF2-40B4-BE49-F238E27FC236}">
-                <a16:creationId xmlns:a16="http://schemas.microsoft.com/office/drawing/2014/main" id="{450C682D-A860-3D06-2A9A-7D497B1BF34C}"/>
-              </a:ext>
-            </a:extLst>
-          </p:cNvPr>
-          <p:cNvSpPr>
-            <a:spLocks noGrp="1"/>
-          </p:cNvSpPr>
-          <p:nvPr>
-            <p:ph idx="1"/>
-          </p:nvPr>
-        </p:nvSpPr>
-        <p:spPr/>
-        <p:txBody>
-          <a:bodyPr numCol="2">
-            <a:normAutofit fontScale="32500" lnSpcReduction="20000"/>
-          </a:bodyPr>
-          <a:lstStyle/>
-          <a:p>
-            <a:r>
-              <a:rPr lang="pt-BR" dirty="0"/>
-              <a:t>ARORA, </a:t>
-            </a:r>
-            <a:r>
-              <a:rPr lang="pt-BR" dirty="0" err="1"/>
-              <a:t>Vishesh</a:t>
-            </a:r>
-            <a:r>
-              <a:rPr lang="pt-BR" dirty="0"/>
-              <a:t>. </a:t>
-            </a:r>
-            <a:r>
-              <a:rPr lang="pt-BR" b="1" dirty="0"/>
-              <a:t>O que é Big Data?</a:t>
-            </a:r>
-            <a:r>
-              <a:rPr lang="pt-BR" dirty="0"/>
-              <a:t>: introdução, usos e aplicações.. Introdução, Usos e Aplicações.. 2021. Disponível em: </a:t>
-            </a:r>
-            <a:r>
-              <a:rPr lang="pt-BR" dirty="0">
-                <a:hlinkClick r:id="rId2"/>
-              </a:rPr>
-              <a:t>https://www.analyticsvidhya.com/blog/2021/05/what-is-big-data-introduction-uses-and-applications/</a:t>
-            </a:r>
-            <a:r>
-              <a:rPr lang="pt-BR" dirty="0"/>
-              <a:t>. Acesso em: 24 mar. 2022.</a:t>
-            </a:r>
-          </a:p>
-          <a:p>
-            <a:r>
-              <a:rPr lang="pt-BR" dirty="0"/>
-              <a:t>AWS. </a:t>
-            </a:r>
-            <a:r>
-              <a:rPr lang="pt-BR" b="1" dirty="0"/>
-              <a:t>O que é ETL?</a:t>
-            </a:r>
-            <a:r>
-              <a:rPr lang="pt-BR" dirty="0"/>
-              <a:t> Disponível em: </a:t>
-            </a:r>
-            <a:r>
-              <a:rPr lang="pt-BR" dirty="0">
-                <a:hlinkClick r:id="rId3"/>
-              </a:rPr>
-              <a:t>https://aws.amazon.com/pt/what-is/etl/</a:t>
-            </a:r>
-            <a:r>
-              <a:rPr lang="pt-BR" dirty="0"/>
-              <a:t>. Acesso em: 11 abr. 2023.</a:t>
-            </a:r>
-          </a:p>
-          <a:p>
-            <a:r>
-              <a:rPr lang="pt-BR" dirty="0"/>
-              <a:t>AWS. </a:t>
-            </a:r>
-            <a:r>
-              <a:rPr lang="pt-BR" b="1" dirty="0"/>
-              <a:t>O que é um data </a:t>
-            </a:r>
-            <a:r>
-              <a:rPr lang="pt-BR" b="1" dirty="0" err="1"/>
-              <a:t>lake</a:t>
-            </a:r>
-            <a:r>
-              <a:rPr lang="pt-BR" b="1" dirty="0"/>
-              <a:t>?</a:t>
-            </a:r>
-            <a:r>
-              <a:rPr lang="pt-BR" dirty="0"/>
-              <a:t>: armazene todos os seus dados em um repositório centralizado em qualquer escala. Armazene todos os seus dados em um repositório centralizado em qualquer escala. Disponível em: </a:t>
-            </a:r>
-            <a:r>
-              <a:rPr lang="pt-BR" dirty="0">
-                <a:hlinkClick r:id="rId4"/>
-              </a:rPr>
-              <a:t>https://aws.amazon.com/pt/big-data/datalakes-and-analytics/what-is-a-data-lake/</a:t>
-            </a:r>
-            <a:r>
-              <a:rPr lang="pt-BR" dirty="0"/>
-              <a:t>. Acesso em: 04 abr. 2023.</a:t>
-            </a:r>
-          </a:p>
-          <a:p>
-            <a:r>
-              <a:rPr lang="pt-BR" dirty="0"/>
-              <a:t>BLASI, Isabela. </a:t>
-            </a:r>
-            <a:r>
-              <a:rPr lang="pt-BR" b="1" dirty="0"/>
-              <a:t>ETL </a:t>
-            </a:r>
-            <a:r>
-              <a:rPr lang="pt-BR" b="1" dirty="0" err="1"/>
-              <a:t>X</a:t>
-            </a:r>
-            <a:r>
-              <a:rPr lang="pt-BR" b="1" dirty="0"/>
-              <a:t> ELT: qual a diferença?</a:t>
-            </a:r>
-            <a:r>
-              <a:rPr lang="pt-BR" dirty="0"/>
-              <a:t> 2020. Disponível em: </a:t>
-            </a:r>
-            <a:r>
-              <a:rPr lang="pt-BR" dirty="0">
-                <a:hlinkClick r:id="rId5"/>
-              </a:rPr>
-              <a:t>https://blog.indicium.tech/etl-vs-elt-diferencas/?utm_source=Google&amp;utm_medium=cpc&amp;utm_term=&amp;utm_campaign=19229929630&amp;utm_content=&amp;gclid=Cj0KCQiAxbefBhDfARIsAL4XLRpHfjmOB5-JAR-YWRjnhhC1TvnUQNWYbNgtbLE8Rzm5dxDS9LglxFwaAtQCEALw_wcB</a:t>
-            </a:r>
-            <a:r>
-              <a:rPr lang="pt-BR" dirty="0"/>
-              <a:t>. Acesso em: 14 mar. 2023.</a:t>
-            </a:r>
-          </a:p>
-          <a:p>
-            <a:r>
-              <a:rPr lang="pt-BR" dirty="0"/>
-              <a:t>FÁTIMA, </a:t>
-            </a:r>
-            <a:r>
-              <a:rPr lang="pt-BR" dirty="0" err="1"/>
-              <a:t>Nida</a:t>
-            </a:r>
-            <a:r>
-              <a:rPr lang="pt-BR" dirty="0"/>
-              <a:t>. </a:t>
-            </a:r>
-            <a:r>
-              <a:rPr lang="pt-BR" b="1" dirty="0"/>
-              <a:t>ETL vs. ELT: Qual é a diferença?</a:t>
-            </a:r>
-            <a:r>
-              <a:rPr lang="pt-BR" dirty="0"/>
-              <a:t> 2020. Disponível em: </a:t>
-            </a:r>
-            <a:r>
-              <a:rPr lang="pt-BR" dirty="0">
-                <a:hlinkClick r:id="rId6"/>
-              </a:rPr>
-              <a:t>https://www.astera.com/pt/type/blog/etl-vs-elt-whats-the-difference/</a:t>
-            </a:r>
-            <a:r>
-              <a:rPr lang="pt-BR" dirty="0"/>
-              <a:t>. Acesso em: 14 mar. 2023.</a:t>
-            </a:r>
-          </a:p>
-          <a:p>
-            <a:r>
-              <a:rPr lang="pt-BR" dirty="0"/>
-              <a:t>FÁTIMA, </a:t>
-            </a:r>
-            <a:r>
-              <a:rPr lang="pt-BR" dirty="0" err="1"/>
-              <a:t>Nida</a:t>
-            </a:r>
-            <a:r>
-              <a:rPr lang="pt-BR" dirty="0"/>
-              <a:t>. </a:t>
-            </a:r>
-            <a:r>
-              <a:rPr lang="pt-BR" b="1" dirty="0"/>
-              <a:t>O que é um data </a:t>
-            </a:r>
-            <a:r>
-              <a:rPr lang="pt-BR" b="1" dirty="0" err="1"/>
-              <a:t>warehouse</a:t>
-            </a:r>
-            <a:r>
-              <a:rPr lang="pt-BR" dirty="0"/>
-              <a:t>: definição, exemplo e benefícios. definição, exemplo e benefícios. 2019. Disponível em: </a:t>
-            </a:r>
-            <a:r>
-              <a:rPr lang="pt-BR" dirty="0">
-                <a:hlinkClick r:id="rId7"/>
-              </a:rPr>
-              <a:t>https://www.astera.com/pt/tipo/blog/definição-de-data-warehouse/</a:t>
-            </a:r>
-            <a:r>
-              <a:rPr lang="pt-BR" dirty="0"/>
-              <a:t>. Acesso em: 04 abr. 2023.</a:t>
-            </a:r>
-          </a:p>
-          <a:p>
-            <a:r>
-              <a:rPr lang="pt-BR" dirty="0"/>
-              <a:t>JUNIOR, Jose Carlos Da Silva Freitas; MAÇADA, </a:t>
-            </a:r>
-            <a:r>
-              <a:rPr lang="pt-BR" dirty="0" err="1"/>
-              <a:t>Antonio</a:t>
-            </a:r>
-            <a:r>
-              <a:rPr lang="pt-BR" dirty="0"/>
-              <a:t> Carlos </a:t>
-            </a:r>
-            <a:r>
-              <a:rPr lang="pt-BR" dirty="0" err="1"/>
-              <a:t>Gastaud</a:t>
-            </a:r>
-            <a:r>
-              <a:rPr lang="pt-BR" dirty="0"/>
-              <a:t>; OLIVEIRA, Mirian; BRINKHUES, Rafael Alfonso. BIG DATA E GESTÃO DO CONHECIMENTO: DEFINIÇÕES E DIRECIONAMENTOS DE PESQUISA. </a:t>
-            </a:r>
-            <a:r>
-              <a:rPr lang="pt-BR" b="1" dirty="0"/>
-              <a:t>REVISTA ALCANCE</a:t>
-            </a:r>
-            <a:r>
-              <a:rPr lang="pt-BR" dirty="0"/>
-              <a:t>, [</a:t>
-            </a:r>
-            <a:r>
-              <a:rPr lang="pt-BR" i="1" dirty="0"/>
-              <a:t>S. l.</a:t>
-            </a:r>
-            <a:r>
-              <a:rPr lang="pt-BR" dirty="0"/>
-              <a:t>], p. 04-22, 1 nov. 2016.</a:t>
-            </a:r>
-          </a:p>
-          <a:p>
-            <a:r>
-              <a:rPr lang="pt-BR" dirty="0"/>
-              <a:t>MICROSOFT. </a:t>
-            </a:r>
-            <a:r>
-              <a:rPr lang="pt-BR" b="1" dirty="0" err="1"/>
-              <a:t>Extract</a:t>
-            </a:r>
-            <a:r>
-              <a:rPr lang="pt-BR" b="1" dirty="0"/>
-              <a:t>, </a:t>
-            </a:r>
-            <a:r>
-              <a:rPr lang="pt-BR" b="1" dirty="0" err="1"/>
-              <a:t>transform</a:t>
-            </a:r>
-            <a:r>
-              <a:rPr lang="pt-BR" b="1" dirty="0"/>
-              <a:t>, </a:t>
-            </a:r>
-            <a:r>
-              <a:rPr lang="pt-BR" b="1" dirty="0" err="1"/>
-              <a:t>and</a:t>
-            </a:r>
-            <a:r>
-              <a:rPr lang="pt-BR" b="1" dirty="0"/>
-              <a:t> </a:t>
-            </a:r>
-            <a:r>
-              <a:rPr lang="pt-BR" b="1" dirty="0" err="1"/>
-              <a:t>load</a:t>
-            </a:r>
-            <a:r>
-              <a:rPr lang="pt-BR" b="1" dirty="0"/>
-              <a:t> (ETL)</a:t>
-            </a:r>
-            <a:r>
-              <a:rPr lang="pt-BR" dirty="0"/>
-              <a:t>. Disponível em: </a:t>
-            </a:r>
-            <a:r>
-              <a:rPr lang="pt-BR" dirty="0">
-                <a:hlinkClick r:id="rId8"/>
-              </a:rPr>
-              <a:t>https://learn.microsoft.com/en-us/azure/architecture/data-guide/relational-data/etl</a:t>
-            </a:r>
-            <a:r>
-              <a:rPr lang="pt-BR" dirty="0"/>
-              <a:t>. Acesso em: 11 abr. 2023.</a:t>
-            </a:r>
-          </a:p>
-          <a:p>
-            <a:r>
-              <a:rPr lang="pt-BR" dirty="0"/>
-              <a:t>MICROSOFT. </a:t>
-            </a:r>
-            <a:r>
-              <a:rPr lang="pt-BR" b="1" dirty="0"/>
-              <a:t>O que é Data Lake</a:t>
-            </a:r>
-            <a:r>
-              <a:rPr lang="pt-BR" dirty="0"/>
-              <a:t>: veja como os data </a:t>
-            </a:r>
-            <a:r>
-              <a:rPr lang="pt-BR" dirty="0" err="1"/>
-              <a:t>lakes</a:t>
-            </a:r>
-            <a:r>
-              <a:rPr lang="pt-BR" dirty="0"/>
-              <a:t> diferem de data </a:t>
-            </a:r>
-            <a:r>
-              <a:rPr lang="pt-BR" dirty="0" err="1"/>
-              <a:t>warehouses</a:t>
-            </a:r>
-            <a:r>
-              <a:rPr lang="pt-BR" dirty="0"/>
-              <a:t> e data </a:t>
-            </a:r>
-            <a:r>
-              <a:rPr lang="pt-BR" dirty="0" err="1"/>
-              <a:t>lakehouses</a:t>
-            </a:r>
-            <a:r>
-              <a:rPr lang="pt-BR" dirty="0"/>
-              <a:t>. descubra como criar uma base escalonável para todas as suas análises com o </a:t>
-            </a:r>
-            <a:r>
-              <a:rPr lang="pt-BR" dirty="0" err="1"/>
-              <a:t>azure</a:t>
-            </a:r>
-            <a:r>
-              <a:rPr lang="pt-BR" dirty="0"/>
-              <a:t>. Disponível em: </a:t>
-            </a:r>
-            <a:r>
-              <a:rPr lang="pt-BR" dirty="0">
-                <a:hlinkClick r:id="rId9"/>
-              </a:rPr>
-              <a:t>https://azure.microsoft.com/pt-br/resources/cloud-computing-dictionary/what-is-a-data-lake/#what-is-a-data-lake</a:t>
-            </a:r>
-            <a:r>
-              <a:rPr lang="pt-BR" dirty="0"/>
-              <a:t>. Acesso em: 03 abr. 2023</a:t>
-            </a:r>
-          </a:p>
-          <a:p>
-            <a:r>
-              <a:rPr lang="pt-BR" dirty="0"/>
-              <a:t>MICROSOFT. </a:t>
-            </a:r>
-            <a:r>
-              <a:rPr lang="pt-BR" b="1" dirty="0"/>
-              <a:t>O que é um data </a:t>
-            </a:r>
-            <a:r>
-              <a:rPr lang="pt-BR" b="1" dirty="0" err="1"/>
-              <a:t>warehouse</a:t>
-            </a:r>
-            <a:r>
-              <a:rPr lang="pt-BR" b="1" dirty="0"/>
-              <a:t>?</a:t>
-            </a:r>
-            <a:r>
-              <a:rPr lang="pt-BR" dirty="0"/>
-              <a:t>: saiba o que é data </a:t>
-            </a:r>
-            <a:r>
-              <a:rPr lang="pt-BR" dirty="0" err="1"/>
-              <a:t>warehouse</a:t>
-            </a:r>
-            <a:r>
-              <a:rPr lang="pt-BR" dirty="0"/>
-              <a:t>, os benefícios de usar um, as práticas recomendadas a serem consideradas durante a fase de design e quais ferramentas incorporar quando finalmente for a hora de criar. Disponível em: </a:t>
-            </a:r>
-            <a:r>
-              <a:rPr lang="pt-BR" dirty="0">
-                <a:hlinkClick r:id="rId10"/>
-              </a:rPr>
-              <a:t>https://azure.microsoft.com/pt-br/resources/cloud-computing-dictionary/what-is-a-data-warehouse/#get-started</a:t>
-            </a:r>
-            <a:r>
-              <a:rPr lang="pt-BR" dirty="0"/>
-              <a:t>. Acesso em: 04 abr. 2023.</a:t>
-            </a:r>
-          </a:p>
-          <a:p>
-            <a:r>
-              <a:rPr lang="pt-BR" dirty="0"/>
-              <a:t>PAUNCZ, Alex. </a:t>
-            </a:r>
-            <a:r>
-              <a:rPr lang="pt-BR" b="1" dirty="0"/>
-              <a:t>ETL vs. ELT: </a:t>
-            </a:r>
-            <a:r>
-              <a:rPr lang="pt-BR" b="1" dirty="0" err="1"/>
-              <a:t>Which</a:t>
-            </a:r>
-            <a:r>
-              <a:rPr lang="pt-BR" b="1" dirty="0"/>
-              <a:t> </a:t>
-            </a:r>
-            <a:r>
-              <a:rPr lang="pt-BR" b="1" dirty="0" err="1"/>
-              <a:t>is</a:t>
-            </a:r>
-            <a:r>
-              <a:rPr lang="pt-BR" b="1" dirty="0"/>
-              <a:t> </a:t>
-            </a:r>
-            <a:r>
-              <a:rPr lang="pt-BR" b="1" dirty="0" err="1"/>
-              <a:t>Right</a:t>
-            </a:r>
-            <a:r>
-              <a:rPr lang="pt-BR" b="1" dirty="0"/>
-              <a:t> for </a:t>
-            </a:r>
-            <a:r>
-              <a:rPr lang="pt-BR" b="1" dirty="0" err="1"/>
-              <a:t>Your</a:t>
-            </a:r>
-            <a:r>
-              <a:rPr lang="pt-BR" b="1" dirty="0"/>
-              <a:t> Data </a:t>
-            </a:r>
-            <a:r>
-              <a:rPr lang="pt-BR" b="1" dirty="0" err="1"/>
-              <a:t>Warehouse</a:t>
-            </a:r>
-            <a:r>
-              <a:rPr lang="pt-BR" b="1" dirty="0"/>
-              <a:t>?</a:t>
-            </a:r>
-            <a:r>
-              <a:rPr lang="pt-BR" dirty="0"/>
-              <a:t> 2021. Disponível em: </a:t>
-            </a:r>
-            <a:r>
-              <a:rPr lang="pt-BR" dirty="0">
-                <a:hlinkClick r:id="rId11"/>
-              </a:rPr>
-              <a:t>https://www.cdata.com/blog/20210706-etl-vs-elt?kw=&amp;cpn=2023385644&amp;utm_source=google&amp;utm_medium=cpc&amp;utm_campaign=CData_-_Search_-_Branding_-_DSA&amp;utm_content=Branding_-_DSA&amp;utm_term=|&amp;kw=&amp;cpn=2023385644&amp;gclid=Cj0KCQiAxbefBhDfARIsAL4XLRq3JP_lo9i_9EkvWfp2MfeKGGo6tQZZ8Vq7O0HjCcs0lZVzuOso-zIaAirnEALw_wcB</a:t>
-            </a:r>
-            <a:r>
-              <a:rPr lang="pt-BR" dirty="0"/>
-              <a:t>. Acesso em: 14 mar. 2023.</a:t>
-            </a:r>
-          </a:p>
-          <a:p>
-            <a:r>
-              <a:rPr lang="pt-BR" dirty="0"/>
-              <a:t>SEGNER, Michael. </a:t>
-            </a:r>
-            <a:r>
-              <a:rPr lang="pt-BR" b="1" dirty="0"/>
-              <a:t>ETL </a:t>
-            </a:r>
-            <a:r>
-              <a:rPr lang="pt-BR" b="1" dirty="0" err="1"/>
-              <a:t>vs</a:t>
-            </a:r>
-            <a:r>
-              <a:rPr lang="pt-BR" b="1" dirty="0"/>
-              <a:t> ELT: </a:t>
-            </a:r>
-            <a:r>
-              <a:rPr lang="pt-BR" b="1" dirty="0" err="1"/>
-              <a:t>What’s</a:t>
-            </a:r>
-            <a:r>
-              <a:rPr lang="pt-BR" b="1" dirty="0"/>
-              <a:t> </a:t>
-            </a:r>
-            <a:r>
-              <a:rPr lang="pt-BR" b="1" dirty="0" err="1"/>
-              <a:t>the</a:t>
-            </a:r>
-            <a:r>
-              <a:rPr lang="pt-BR" b="1" dirty="0"/>
-              <a:t> </a:t>
-            </a:r>
-            <a:r>
-              <a:rPr lang="pt-BR" b="1" dirty="0" err="1"/>
-              <a:t>Difference</a:t>
-            </a:r>
-            <a:r>
-              <a:rPr lang="pt-BR" b="1" dirty="0"/>
-              <a:t> (</a:t>
-            </a:r>
-            <a:r>
-              <a:rPr lang="pt-BR" b="1" dirty="0" err="1"/>
-              <a:t>and</a:t>
-            </a:r>
-            <a:r>
-              <a:rPr lang="pt-BR" b="1" dirty="0"/>
-              <a:t> </a:t>
-            </a:r>
-            <a:r>
-              <a:rPr lang="pt-BR" b="1" dirty="0" err="1"/>
-              <a:t>Which</a:t>
-            </a:r>
-            <a:r>
-              <a:rPr lang="pt-BR" b="1" dirty="0"/>
-              <a:t> </a:t>
-            </a:r>
-            <a:r>
-              <a:rPr lang="pt-BR" b="1" dirty="0" err="1"/>
-              <a:t>is</a:t>
-            </a:r>
-            <a:r>
-              <a:rPr lang="pt-BR" b="1" dirty="0"/>
-              <a:t> </a:t>
-            </a:r>
-            <a:r>
-              <a:rPr lang="pt-BR" b="1" dirty="0" err="1"/>
-              <a:t>Better</a:t>
-            </a:r>
-            <a:r>
-              <a:rPr lang="pt-BR" b="1" dirty="0"/>
-              <a:t>)?</a:t>
-            </a:r>
-            <a:r>
-              <a:rPr lang="pt-BR" dirty="0"/>
-              <a:t> 2023. Disponível em: </a:t>
-            </a:r>
-            <a:r>
-              <a:rPr lang="pt-BR" dirty="0">
-                <a:hlinkClick r:id="rId12"/>
-              </a:rPr>
-              <a:t>https://www.montecarlodata.com/blog-etl-vs-elt/</a:t>
-            </a:r>
-            <a:r>
-              <a:rPr lang="pt-BR" dirty="0"/>
-              <a:t>. Acesso em: 01 mar. 2023.</a:t>
-            </a:r>
-          </a:p>
-          <a:p>
-            <a:r>
-              <a:rPr lang="pt-BR" dirty="0"/>
-              <a:t>SILVA, </a:t>
-            </a:r>
-            <a:r>
-              <a:rPr lang="pt-BR" dirty="0" err="1"/>
-              <a:t>Leidiane</a:t>
-            </a:r>
-            <a:r>
-              <a:rPr lang="pt-BR" dirty="0"/>
-              <a:t> Angelica Nunes da. </a:t>
-            </a:r>
-            <a:r>
-              <a:rPr lang="pt-BR" b="1" dirty="0"/>
-              <a:t>CIÊNCIA DE DADOS COMO MÉTODO DE TRANSFORMAÇÃO DE DADOS EM INFORMAÇÃO</a:t>
-            </a:r>
-            <a:r>
-              <a:rPr lang="pt-BR" dirty="0"/>
-              <a:t>. 2022. 24 f. TCC (Graduação) - Curso de Sistemas Para Internet, Instituto Federal de Educação Ciência e Tecnologia, Salgueiro, 2022.</a:t>
-            </a:r>
-          </a:p>
-          <a:p>
-            <a:endParaRPr lang="pt-BR" dirty="0"/>
-          </a:p>
-        </p:txBody>
-      </p:sp>
-    </p:spTree>
-    <p:extLst>
-      <p:ext uri="{BB962C8B-B14F-4D97-AF65-F5344CB8AC3E}">
-        <p14:creationId xmlns:p14="http://schemas.microsoft.com/office/powerpoint/2010/main" val="3196361605"/>
       </p:ext>
     </p:extLst>
   </p:cSld>
@@ -23807,13 +22989,13 @@
           <a:p>
             <a:r>
               <a:rPr lang="pt-BR" dirty="0"/>
-              <a:t>Comparar os métodos de extração de dados ETL e ELT. A fim de definir qual o melhor método a ser utilizado, levando em consideração suas vantagens e desvantagens.</a:t>
+              <a:t>Comparar os métodos de extração de dados ETL e ELT. Levando em consideração suas vantagens e desvantagens.</a:t>
             </a:r>
           </a:p>
           <a:p>
             <a:r>
               <a:rPr lang="pt-BR" dirty="0"/>
-              <a:t>A escolha entre ETL e ELT para transformação dos dados, pode ter um impacto significativo no sucesso de um projeto para integração de dados. Compreender os fundamentos teóricos e as aplicações práticas dessas duas abordagens é essencial para tomar uma decisão (FÁTIMA, 2020).</a:t>
+              <a:t>A escolha entre ETL e ELT para transformação dos dados, pode ter um impacto significativo no sucesso de um projeto para integração de dados. Compreender os fundamentos teóricos e as aplicações práticas dessas duas abordagens é essencial para tomar uma decisão.</a:t>
             </a:r>
           </a:p>
           <a:p>
@@ -23897,13 +23079,36 @@
         </p:nvSpPr>
         <p:spPr/>
         <p:txBody>
-          <a:bodyPr/>
+          <a:bodyPr>
+            <a:normAutofit fontScale="85000" lnSpcReduction="10000"/>
+          </a:bodyPr>
           <a:lstStyle/>
           <a:p>
             <a:r>
-              <a:rPr lang="pt-BR" dirty="0"/>
-              <a:t>O conceito de Big Data pode ser condensado como sendo um grande volume de dados, sendo eles estruturados ou não estruturados, provenientes de diversas fontes, que devem ser gerenciados e analisados, o maior desafio é transformar todo o volume de dados em informação, gerando assim conhecimento e valor para as organizações (JUNIOR, 2016).</a:t>
+              <a:rPr lang="pt-BR" sz="2800" dirty="0"/>
+              <a:t>O conceito de Big Data pode ser condensado como sendo um grande volume de dados, sendo eles estruturados ou não estruturados, provenientes de diversas fontes, que devem ser gerenciados e analisados, o maior desafio é transformar todo o volume de dados em informação, gerando assim conhecimento e valor para as organizações.</a:t>
             </a:r>
+          </a:p>
+          <a:p>
+            <a:r>
+              <a:rPr lang="pt-BR" sz="2800" dirty="0">
+                <a:effectLst/>
+              </a:rPr>
+              <a:t>A computação em nuvem, está diretamente relacionada ao </a:t>
+            </a:r>
+            <a:r>
+              <a:rPr lang="pt-BR" sz="2800" i="1" dirty="0">
+                <a:effectLst/>
+              </a:rPr>
+              <a:t>Big Data</a:t>
+            </a:r>
+            <a:r>
+              <a:rPr lang="pt-BR" sz="2800" dirty="0">
+                <a:effectLst/>
+              </a:rPr>
+              <a:t>, sendo o principal objetivo da computação em nuvem, usar enormes recursos de computação e armazenamento sob o gerenciamento concentrado.</a:t>
+            </a:r>
+            <a:endParaRPr lang="pt-BR" sz="2800" dirty="0"/>
           </a:p>
         </p:txBody>
       </p:sp>
@@ -24142,11 +23347,14 @@
           <a:lstStyle/>
           <a:p>
             <a:r>
-              <a:rPr lang="pt-BR" sz="2000" dirty="0"/>
-              <a:t>O conceito de Big Data pode ser definido em 5Vs (volume, velocidade, variedade, valor e veracidade) (ARORA, 2021).</a:t>
+              <a:rPr lang="pt-BR" dirty="0"/>
+              <a:t>O conceito de Big Data pode ser definido em 5Vs (volume, velocidade, variedade, valor e veracidade).</a:t>
             </a:r>
           </a:p>
           <a:p>
+            <a:pPr marL="0" indent="0">
+              <a:buNone/>
+            </a:pPr>
             <a:endParaRPr lang="pt-BR" sz="2000" dirty="0"/>
           </a:p>
         </p:txBody>
@@ -26793,15 +26001,7 @@
             </a:r>
             <a:r>
               <a:rPr lang="pt-BR" dirty="0"/>
-              <a:t> é um repositório que armazena dados estruturados e semiestruturados, para relatórios e análises. Assim como o Data Lake o Data </a:t>
-            </a:r>
-            <a:r>
-              <a:rPr lang="pt-BR" dirty="0" err="1"/>
-              <a:t>Warehouse</a:t>
-            </a:r>
-            <a:r>
-              <a:rPr lang="pt-BR" dirty="0"/>
-              <a:t> pode armazenar grandes quantidades de informações e ajuda as empresas na tomada de decisão (FÁTIMA, 2019).</a:t>
+              <a:t> é um repositório que armazena dados estruturados e semiestruturados, para relatórios e análises. Assim como o Data Lake o Data Warehouse pode armazenar grandes quantidades de informações e ajuda as empresas na tomada de decisão.</a:t>
             </a:r>
           </a:p>
           <a:p>
@@ -26819,7 +26019,7 @@
             </a:r>
             <a:r>
               <a:rPr lang="pt-BR" dirty="0"/>
-              <a:t>, pode ser considerado mais do que apenas um repositório de dados. Ele é um sistema altamente estruturado e cuidadosamente arquitetado composto por várias camadas que interage com seus dados e entre si de maneira diferente (MICROSOFT, 2023).</a:t>
+              <a:t>, pode ser considerado mais do que apenas um repositório de dados. Ele é um sistema altamente estruturado e cuidadosamente arquitetado composto por várias camadas que interage com seus dados e entre si de maneira diferente.</a:t>
             </a:r>
           </a:p>
           <a:p>
@@ -27016,8 +26216,8 @@
         </p:nvSpPr>
         <p:spPr>
           <a:xfrm>
-            <a:off x="1141413" y="618518"/>
-            <a:ext cx="4459286" cy="1478570"/>
+            <a:off x="1141412" y="618518"/>
+            <a:ext cx="6194219" cy="912813"/>
           </a:xfrm>
         </p:spPr>
         <p:txBody>
@@ -27056,27 +26256,15 @@
         </p:nvSpPr>
         <p:spPr>
           <a:xfrm>
-            <a:off x="1141412" y="2249487"/>
-            <a:ext cx="4459287" cy="3965046"/>
+            <a:off x="1141412" y="1611313"/>
+            <a:ext cx="4459287" cy="4603220"/>
           </a:xfrm>
         </p:spPr>
         <p:txBody>
           <a:bodyPr>
-            <a:normAutofit/>
+            <a:normAutofit lnSpcReduction="10000"/>
           </a:bodyPr>
           <a:lstStyle/>
-          <a:p>
-            <a:pPr marL="0" indent="0">
-              <a:lnSpc>
-                <a:spcPct val="110000"/>
-              </a:lnSpc>
-              <a:buNone/>
-            </a:pPr>
-            <a:r>
-              <a:rPr lang="pt-BR" sz="1100" dirty="0"/>
-              <a:t>De acordo com Microsoft (2023):</a:t>
-            </a:r>
-          </a:p>
           <a:p>
             <a:pPr>
               <a:lnSpc>
@@ -27086,7 +26274,7 @@
               <a:buChar char="•"/>
             </a:pPr>
             <a:r>
-              <a:rPr lang="pt-BR" sz="1100" dirty="0"/>
+              <a:rPr lang="pt-BR" sz="1400" dirty="0"/>
               <a:t>Consolidação de dados de várias fontes em uma única fonte de verdade.</a:t>
             </a:r>
           </a:p>
@@ -27099,7 +26287,7 @@
               <a:buChar char="•"/>
             </a:pPr>
             <a:r>
-              <a:rPr lang="pt-BR" sz="1100" dirty="0"/>
+              <a:rPr lang="pt-BR" sz="1400" dirty="0"/>
               <a:t>Armazenamento e análise de dados históricos de longo prazo abrangendo meses e anos.</a:t>
             </a:r>
           </a:p>
@@ -27112,7 +26300,7 @@
               <a:buChar char="•"/>
             </a:pPr>
             <a:r>
-              <a:rPr lang="pt-BR" sz="1100" dirty="0"/>
+              <a:rPr lang="pt-BR" sz="1400" dirty="0"/>
               <a:t>Limpando e transformando dados para que eles sejam precisos, consistentes e padronizados em estrutura e forma.</a:t>
             </a:r>
           </a:p>
@@ -27125,7 +26313,7 @@
               <a:buChar char="•"/>
             </a:pPr>
             <a:r>
-              <a:rPr lang="pt-BR" sz="1100" dirty="0"/>
+              <a:rPr lang="pt-BR" sz="1400" dirty="0"/>
               <a:t>Reduzindo os tempos de consulta ao coletar dados e processar análises, o que melhora o desempenho geral em todos os sistemas.</a:t>
             </a:r>
           </a:p>
@@ -27138,7 +26326,7 @@
               <a:buChar char="•"/>
             </a:pPr>
             <a:r>
-              <a:rPr lang="pt-BR" sz="1100" dirty="0"/>
+              <a:rPr lang="pt-BR" sz="1400" dirty="0"/>
               <a:t>Carregando dados com eficiência sem precisar lidar com os custos de implantação ou infraestrutura.</a:t>
             </a:r>
           </a:p>
@@ -27151,7 +26339,7 @@
               <a:buChar char="•"/>
             </a:pPr>
             <a:r>
-              <a:rPr lang="pt-BR" sz="1100" dirty="0"/>
+              <a:rPr lang="pt-BR" sz="1400" dirty="0"/>
               <a:t>Protegendo dados para que eles sejam privados, protegidos e seguros.</a:t>
             </a:r>
           </a:p>
@@ -27164,17 +26352,9 @@
               <a:buChar char="•"/>
             </a:pPr>
             <a:r>
-              <a:rPr lang="pt-BR" sz="1100" dirty="0"/>
+              <a:rPr lang="pt-BR" sz="1400" dirty="0"/>
               <a:t>Preparação de dados para análise por meio de mineração de dados, ferramentas de visualização e outras formas de análise avançada.</a:t>
             </a:r>
-          </a:p>
-          <a:p>
-            <a:pPr>
-              <a:lnSpc>
-                <a:spcPct val="110000"/>
-              </a:lnSpc>
-            </a:pPr>
-            <a:endParaRPr lang="en-US" sz="1100" dirty="0"/>
           </a:p>
         </p:txBody>
       </p:sp>
@@ -29777,68 +28957,45 @@
         <p:spPr/>
         <p:txBody>
           <a:bodyPr>
-            <a:normAutofit fontScale="85000" lnSpcReduction="20000"/>
+            <a:normAutofit fontScale="92500" lnSpcReduction="10000"/>
           </a:bodyPr>
           <a:lstStyle/>
           <a:p>
             <a:r>
-              <a:rPr lang="pt-BR" i="1" dirty="0">
+              <a:rPr lang="pt-BR" dirty="0">
                 <a:effectLst/>
               </a:rPr>
-              <a:t>Data Lake</a:t>
+              <a:t>Data Lake </a:t>
             </a:r>
             <a:r>
               <a:rPr lang="pt-BR" dirty="0"/>
-              <a:t> é um repositório que armazena todos os dados estruturados, não estruturados e semiestruturados. Ajuda muitas empresas na tomada de decisão, as empresas que implementaram os </a:t>
+              <a:t>é</a:t>
+            </a:r>
+            <a:r>
+              <a:rPr lang="pt-BR" dirty="0">
+                <a:effectLst/>
+              </a:rPr>
+              <a:t> um repositório que armazena todos os dados estruturados, não estruturados e semiestruturados, com diferentes formatos, permitindo que seja gerado um conjunto de estratégias de negócios</a:t>
+            </a:r>
+            <a:r>
+              <a:rPr lang="pt-BR" dirty="0"/>
+              <a:t>.</a:t>
+            </a:r>
+          </a:p>
+          <a:p>
+            <a:r>
+              <a:rPr lang="pt-BR" dirty="0">
+                <a:effectLst/>
+              </a:rPr>
+              <a:t>Um Data Lake, propõe um armazenamento de dados em seu formato nativo, em local de armazenamento evolutivo. A ideia básica é que todos os dados emitidos pela organização, sejam armazenados em uma única estrutura de dados. Esses dados serão armazenados em seu formato original, dispensando a etapa de transformação, agilizando a disponibilidade desses dados. Propondo assim um novo modelo de processamento conhecido como ELT</a:t>
             </a:r>
             <a:r>
               <a:rPr lang="pt-BR" i="1" dirty="0">
                 <a:effectLst/>
               </a:rPr>
-              <a:t>Data </a:t>
+              <a:t>.</a:t>
             </a:r>
-            <a:r>
-              <a:rPr lang="pt-BR" i="1" dirty="0" err="1">
-                <a:effectLst/>
-              </a:rPr>
-              <a:t>Lakes</a:t>
-            </a:r>
-            <a:r>
-              <a:rPr lang="pt-BR" dirty="0"/>
-              <a:t> superaram 9% a performance de empresas semelhantes no crescimento orgânico da receita (AWS, 2023).</a:t>
-            </a:r>
-          </a:p>
-          <a:p>
-            <a:r>
-              <a:rPr lang="pt-BR" dirty="0"/>
-              <a:t>O </a:t>
-            </a:r>
-            <a:r>
-              <a:rPr lang="pt-BR" i="1" dirty="0">
-                <a:effectLst/>
-              </a:rPr>
-              <a:t>Data Lake</a:t>
-            </a:r>
-            <a:r>
-              <a:rPr lang="pt-BR" dirty="0"/>
-              <a:t> é ideal para ser implantado na nuvem, pois oferece uma performance, escalabilidade, confiabilidade, disponibilidade, mecanismo analítico e enormes economias. Os principais motivos que os clientes perceberam a nuvem como vantagem para </a:t>
-            </a:r>
-            <a:r>
-              <a:rPr lang="pt-BR" i="1" dirty="0">
-                <a:effectLst/>
-              </a:rPr>
-              <a:t>Data </a:t>
-            </a:r>
-            <a:r>
-              <a:rPr lang="pt-BR" i="1" dirty="0" err="1">
-                <a:effectLst/>
-              </a:rPr>
-              <a:t>Lakes</a:t>
-            </a:r>
-            <a:r>
-              <a:rPr lang="pt-BR" dirty="0"/>
-              <a:t> são: segurança, implantação mais rápida, disponibilidade, atualização de recursos, funcionalidades, elasticidade, cobertura geográfica e custo vinculados à utilização real (AWS, 2023).</a:t>
-            </a:r>
+            <a:endParaRPr lang="pt-BR" i="1" dirty="0"/>
           </a:p>
         </p:txBody>
       </p:sp>
@@ -30032,7 +29189,7 @@
         <p:spPr>
           <a:xfrm>
             <a:off x="1141413" y="618518"/>
-            <a:ext cx="4459286" cy="1478570"/>
+            <a:ext cx="4459286" cy="1011790"/>
           </a:xfrm>
         </p:spPr>
         <p:txBody>
@@ -30042,9 +29199,14 @@
           <a:lstStyle/>
           <a:p>
             <a:r>
-              <a:rPr lang="pt-BR" sz="3200"/>
-              <a:t>Data lake</a:t>
+              <a:rPr lang="pt-BR" sz="3200" dirty="0"/>
+              <a:t>Data </a:t>
             </a:r>
+            <a:r>
+              <a:rPr lang="pt-BR" sz="3200" dirty="0" err="1"/>
+              <a:t>lake</a:t>
+            </a:r>
+            <a:endParaRPr lang="pt-BR" sz="3200" dirty="0"/>
           </a:p>
         </p:txBody>
       </p:sp>
@@ -30066,13 +29228,13 @@
         </p:nvSpPr>
         <p:spPr>
           <a:xfrm>
-            <a:off x="1141412" y="2249487"/>
-            <a:ext cx="4459287" cy="3965046"/>
+            <a:off x="1141412" y="1630308"/>
+            <a:ext cx="4459287" cy="4584225"/>
           </a:xfrm>
         </p:spPr>
         <p:txBody>
           <a:bodyPr>
-            <a:normAutofit/>
+            <a:normAutofit fontScale="92500" lnSpcReduction="10000"/>
           </a:bodyPr>
           <a:lstStyle/>
           <a:p>
@@ -30084,7 +29246,7 @@
               <a:buChar char="•"/>
             </a:pPr>
             <a:r>
-              <a:rPr lang="pt-BR" sz="1100" dirty="0"/>
+              <a:rPr lang="pt-BR" sz="1500" dirty="0"/>
               <a:t>Movimentação de dados</a:t>
             </a:r>
           </a:p>
@@ -30096,20 +29258,16 @@
               <a:buNone/>
             </a:pPr>
             <a:r>
-              <a:rPr lang="pt-BR" sz="1100" dirty="0"/>
+              <a:rPr lang="pt-BR" sz="1400" dirty="0"/>
               <a:t>Os </a:t>
             </a:r>
             <a:r>
-              <a:rPr lang="pt-BR" sz="1100" i="1" dirty="0"/>
-              <a:t>Data </a:t>
+              <a:rPr lang="pt-BR" sz="1400" i="1" dirty="0"/>
+              <a:t>Data Lakes</a:t>
             </a:r>
             <a:r>
-              <a:rPr lang="pt-BR" sz="1100" i="1" dirty="0" err="1"/>
-              <a:t>Lakes</a:t>
-            </a:r>
-            <a:r>
-              <a:rPr lang="pt-BR" sz="1100" dirty="0"/>
-              <a:t> permitem importar qualquer quantidade de dados em tempo real economizando tempo na definição de estrutura de dados, esquemas e transformação (AWS, 2023).</a:t>
+              <a:rPr lang="pt-BR" sz="1400" dirty="0"/>
+              <a:t> permitem importar qualquer quantidade de dados em tempo real economizando tempo na definição de estrutura de dados, esquemas e transformação.</a:t>
             </a:r>
           </a:p>
           <a:p>
@@ -30121,8 +29279,8 @@
               <a:buChar char="•"/>
             </a:pPr>
             <a:r>
-              <a:rPr lang="pt-BR" sz="1100" dirty="0"/>
-              <a:t>Armazene e catalogue dados com segurança</a:t>
+              <a:rPr lang="pt-BR" sz="1500" dirty="0"/>
+              <a:t>Armazenamento e catalogação dos dados com segurança</a:t>
             </a:r>
           </a:p>
           <a:p>
@@ -30133,56 +29291,56 @@
               <a:buNone/>
             </a:pPr>
             <a:r>
-              <a:rPr lang="pt-BR" sz="1100" dirty="0"/>
+              <a:rPr lang="pt-BR" sz="1400" dirty="0"/>
               <a:t>Os </a:t>
             </a:r>
             <a:r>
-              <a:rPr lang="pt-BR" sz="1100" i="1" dirty="0"/>
+              <a:rPr lang="pt-BR" sz="1400" i="1" dirty="0"/>
               <a:t>Datas </a:t>
             </a:r>
             <a:r>
-              <a:rPr lang="pt-BR" sz="1100" i="1" dirty="0" err="1"/>
+              <a:rPr lang="pt-BR" sz="1400" i="1" dirty="0" err="1"/>
               <a:t>Lakes</a:t>
             </a:r>
             <a:r>
-              <a:rPr lang="pt-BR" sz="1100" dirty="0"/>
+              <a:rPr lang="pt-BR" sz="1400" dirty="0"/>
               <a:t> permitem armazenar dados relacionais, como banco de dados operacionais e dados de aplicações de linha de negócios, dados não relacionais também como aplicativos móveis, dispositivos </a:t>
             </a:r>
             <a:r>
-              <a:rPr lang="pt-BR" sz="1100" i="1" dirty="0"/>
+              <a:rPr lang="pt-BR" sz="1400" i="1" dirty="0"/>
               <a:t>Internet </a:t>
             </a:r>
             <a:r>
-              <a:rPr lang="pt-BR" sz="1100" i="1" dirty="0" err="1"/>
+              <a:rPr lang="pt-BR" sz="1400" i="1" dirty="0" err="1"/>
               <a:t>of</a:t>
             </a:r>
             <a:r>
-              <a:rPr lang="pt-BR" sz="1100" i="1" dirty="0"/>
+              <a:rPr lang="pt-BR" sz="1400" i="1" dirty="0"/>
               <a:t> </a:t>
             </a:r>
             <a:r>
-              <a:rPr lang="pt-BR" sz="1100" i="1" dirty="0" err="1"/>
+              <a:rPr lang="pt-BR" sz="1400" i="1" dirty="0" err="1"/>
               <a:t>Things</a:t>
             </a:r>
             <a:r>
-              <a:rPr lang="pt-BR" sz="1100" dirty="0"/>
+              <a:rPr lang="pt-BR" sz="1400" dirty="0"/>
               <a:t> (</a:t>
             </a:r>
             <a:r>
-              <a:rPr lang="pt-BR" sz="1100" dirty="0" err="1"/>
+              <a:rPr lang="pt-BR" sz="1400" dirty="0" err="1"/>
               <a:t>IoT</a:t>
             </a:r>
             <a:r>
-              <a:rPr lang="pt-BR" sz="1100" dirty="0"/>
+              <a:rPr lang="pt-BR" sz="1400" dirty="0"/>
               <a:t>) e mídias sociais. Tem capacidade de atender dados por meio de </a:t>
             </a:r>
             <a:r>
-              <a:rPr lang="pt-BR" sz="1100" i="1" dirty="0" err="1"/>
+              <a:rPr lang="pt-BR" sz="1400" i="1" dirty="0" err="1"/>
               <a:t>crawling</a:t>
             </a:r>
             <a:r>
-              <a:rPr lang="pt-BR" sz="1100" dirty="0"/>
-              <a:t>, catalogação e indexação de dados. Os dados têm que ser protegidos para garantir que os ativos dados sejam protegidos (AWS, 2023).</a:t>
+              <a:rPr lang="pt-BR" sz="1400" dirty="0"/>
+              <a:t>, catalogação e indexação de dados. Os dados têm que ser protegidos para garantir que os ativos dados sejam protegidos.</a:t>
             </a:r>
           </a:p>
           <a:p>
@@ -30192,14 +29350,14 @@
               </a:lnSpc>
             </a:pPr>
             <a:r>
-              <a:rPr lang="pt-BR" sz="1100" i="1" dirty="0" err="1"/>
+              <a:rPr lang="pt-BR" sz="1500" i="1" dirty="0" err="1"/>
               <a:t>Machine</a:t>
             </a:r>
             <a:r>
-              <a:rPr lang="pt-BR" sz="1100" i="1" dirty="0"/>
+              <a:rPr lang="pt-BR" sz="1500" i="1" dirty="0"/>
               <a:t> Learning</a:t>
             </a:r>
-            <a:endParaRPr lang="pt-BR" sz="1100" dirty="0"/>
+            <a:endParaRPr lang="pt-BR" sz="1500" dirty="0"/>
           </a:p>
           <a:p>
             <a:pPr marL="0" indent="0">
@@ -30209,28 +29367,28 @@
               <a:buNone/>
             </a:pPr>
             <a:r>
-              <a:rPr lang="pt-BR" sz="1100" dirty="0"/>
+              <a:rPr lang="pt-BR" sz="1400" dirty="0"/>
               <a:t>O </a:t>
             </a:r>
             <a:r>
-              <a:rPr lang="pt-BR" sz="1100" i="1" dirty="0"/>
+              <a:rPr lang="pt-BR" sz="1400" i="1" dirty="0"/>
               <a:t>Data Lake</a:t>
             </a:r>
             <a:r>
-              <a:rPr lang="pt-BR" sz="1100" dirty="0"/>
+              <a:rPr lang="pt-BR" sz="1400" dirty="0"/>
               <a:t> permite que a empresa gere diferentes tipos de situações, incluindo relatórios de dados históricos e </a:t>
             </a:r>
             <a:r>
-              <a:rPr lang="pt-BR" sz="1100" i="1" dirty="0" err="1"/>
+              <a:rPr lang="pt-BR" sz="1400" i="1" dirty="0" err="1"/>
               <a:t>Machine</a:t>
             </a:r>
             <a:r>
-              <a:rPr lang="pt-BR" sz="1100" i="1" dirty="0"/>
+              <a:rPr lang="pt-BR" sz="1400" i="1" dirty="0"/>
               <a:t> Learning</a:t>
             </a:r>
             <a:r>
-              <a:rPr lang="pt-BR" sz="1100" dirty="0"/>
-              <a:t>, criando modelos para prever resultados sugerindo uma série de ações prescritas para chegar no resultado ideal (AWS, 2023).</a:t>
+              <a:rPr lang="pt-BR" sz="1400" dirty="0"/>
+              <a:t>, criando modelos para prever resultados sugerindo uma série de ações prescritas para chegar no resultado ideal.</a:t>
             </a:r>
           </a:p>
           <a:p>

</xml_diff>